<commit_message>
Some first text ideas...
</commit_message>
<xml_diff>
--- a/poster/lex2018_poster_Grenzschichthöhe2.pptx
+++ b/poster/lex2018_poster_Grenzschichthöhe2.pptx
@@ -295,7 +295,7 @@
               <a:pPr>
                 <a:defRPr/>
               </a:pPr>
-              <a:t>16.09.2018</a:t>
+              <a:t>18.09.2018</a:t>
             </a:fld>
             <a:endParaRPr lang="de-DE"/>
           </a:p>
@@ -598,7 +598,7 @@
               <a14:shadowObscured xmlns:a14="http://schemas.microsoft.com/office/drawing/2010/main" val="1"/>
             </a:ext>
             <a:ext uri="{FAA26D3D-D897-4be2-8F04-BA451C77F1D7}">
-              <ma14:placeholderFlag xmlns="" xmlns:ma14="http://schemas.microsoft.com/office/mac/drawingml/2011/main" val="1"/>
+              <ma14:placeholderFlag xmlns:ma14="http://schemas.microsoft.com/office/mac/drawingml/2011/main" xmlns="" val="1"/>
             </a:ext>
           </a:extLst>
         </p:spPr>
@@ -1148,7 +1148,7 @@
           <a:noFill/>
           <a:extLst>
             <a:ext uri="{FAA26D3D-D897-4be2-8F04-BA451C77F1D7}">
-              <ma14:placeholderFlag xmlns="" xmlns:ma14="http://schemas.microsoft.com/office/mac/drawingml/2011/main" val="1"/>
+              <ma14:placeholderFlag xmlns:ma14="http://schemas.microsoft.com/office/mac/drawingml/2011/main" xmlns="" val="1"/>
             </a:ext>
           </a:extLst>
         </p:spPr>
@@ -3298,15 +3298,15 @@
         </p:nvSpPr>
         <p:spPr>
           <a:xfrm>
-            <a:off x="591990" y="7333442"/>
-            <a:ext cx="15135225" cy="769441"/>
+            <a:off x="1456085" y="7333442"/>
+            <a:ext cx="14329593" cy="4647426"/>
           </a:xfrm>
           <a:prstGeom prst="rect">
             <a:avLst/>
           </a:prstGeom>
         </p:spPr>
         <p:txBody>
-          <a:bodyPr>
+          <a:bodyPr wrap="square">
             <a:spAutoFit/>
           </a:bodyPr>
           <a:lstStyle/>
@@ -3321,47 +3321,451 @@
               <a:t>Motivation</a:t>
             </a:r>
           </a:p>
-        </p:txBody>
-      </p:sp>
-      <p:sp>
-        <p:nvSpPr>
-          <p:cNvPr id="30" name="Rechteck 29">
-            <a:extLst>
-              <a:ext uri="{FF2B5EF4-FFF2-40B4-BE49-F238E27FC236}">
-                <a16:creationId xmlns:a16="http://schemas.microsoft.com/office/drawing/2014/main" id="{00F2F1BC-0D66-45C0-8E9C-5464DBC9DD37}"/>
-              </a:ext>
-            </a:extLst>
-          </p:cNvPr>
-          <p:cNvSpPr/>
-          <p:nvPr/>
-        </p:nvSpPr>
-        <p:spPr>
-          <a:xfrm>
-            <a:off x="615497" y="14264904"/>
-            <a:ext cx="15135225" cy="769441"/>
-          </a:xfrm>
-          <a:prstGeom prst="rect">
-            <a:avLst/>
-          </a:prstGeom>
-        </p:spPr>
-        <p:txBody>
-          <a:bodyPr>
-            <a:spAutoFit/>
-          </a:bodyPr>
-          <a:lstStyle/>
           <a:p>
+            <a:pPr algn="just"/>
             <a:r>
-              <a:rPr lang="de-DE" sz="4400" b="1" dirty="0">
-                <a:solidFill>
-                  <a:srgbClr val="CB1028"/>
+              <a:rPr lang="de-DE" sz="3600" i="1" dirty="0">
+                <a:solidFill>
+                  <a:schemeClr val="tx1"/>
                 </a:solidFill>
                 <a:ea typeface="ＭＳ Ｐゴシック" pitchFamily="124" charset="-128"/>
               </a:rPr>
-              <a:t>Methode</a:t>
+              <a:t>Die vertikale Ausdehnung der atmosphärischen Grenzschicht spielt sowohl für die numerische Wettervorhersage als auch bei der Ausbreitung von Luftschadstoffen eine wichtige Rolle. Die ALPACAs bieten die Möglichkeit, Temperatur und Feuchte in der Grenzschicht mit hoher zeitlicher Auflösung zu messen. Wie lassen sich die gewonnenen Daten nutzen, um daraus die Höhe der Grenzschicht zu bestimmen? </a:t>
             </a:r>
           </a:p>
         </p:txBody>
       </p:sp>
+      <mc:AlternateContent xmlns:mc="http://schemas.openxmlformats.org/markup-compatibility/2006">
+        <mc:Choice xmlns:a14="http://schemas.microsoft.com/office/drawing/2010/main" Requires="a14">
+          <p:sp>
+            <p:nvSpPr>
+              <p:cNvPr id="30" name="Rechteck 29">
+                <a:extLst>
+                  <a:ext uri="{FF2B5EF4-FFF2-40B4-BE49-F238E27FC236}">
+                    <a16:creationId xmlns:a16="http://schemas.microsoft.com/office/drawing/2014/main" id="{00F2F1BC-0D66-45C0-8E9C-5464DBC9DD37}"/>
+                  </a:ext>
+                </a:extLst>
+              </p:cNvPr>
+              <p:cNvSpPr/>
+              <p:nvPr/>
+            </p:nvSpPr>
+            <p:spPr>
+              <a:xfrm>
+                <a:off x="1456085" y="12403767"/>
+                <a:ext cx="14329593" cy="12649617"/>
+              </a:xfrm>
+              <a:prstGeom prst="rect">
+                <a:avLst/>
+              </a:prstGeom>
+            </p:spPr>
+            <p:txBody>
+              <a:bodyPr wrap="square">
+                <a:spAutoFit/>
+              </a:bodyPr>
+              <a:lstStyle/>
+              <a:p>
+                <a:r>
+                  <a:rPr lang="de-DE" sz="4400" b="1" dirty="0">
+                    <a:solidFill>
+                      <a:srgbClr val="CB1028"/>
+                    </a:solidFill>
+                    <a:ea typeface="ＭＳ Ｐゴシック" pitchFamily="124" charset="-128"/>
+                  </a:rPr>
+                  <a:t>Methode</a:t>
+                </a:r>
+              </a:p>
+              <a:p>
+                <a:pPr algn="just"/>
+                <a:r>
+                  <a:rPr lang="de-DE" sz="3600" dirty="0">
+                    <a:solidFill>
+                      <a:schemeClr val="tx1"/>
+                    </a:solidFill>
+                    <a:ea typeface="ＭＳ Ｐゴシック" pitchFamily="124" charset="-128"/>
+                  </a:rPr>
+                  <a:t>Aus folgenden Größen, die sich aus den Messungen der ALPACAs ableiten lassen, wurde die Grenzschichthöhe bestimmt:</a:t>
+                </a:r>
+              </a:p>
+              <a:p>
+                <a:pPr algn="just"/>
+                <a:r>
+                  <a:rPr lang="de-DE" sz="3600" dirty="0">
+                    <a:solidFill>
+                      <a:schemeClr val="tx1"/>
+                    </a:solidFill>
+                    <a:ea typeface="ＭＳ Ｐゴシック" pitchFamily="124" charset="-128"/>
+                  </a:rPr>
+                  <a:t>	</a:t>
+                </a:r>
+                <a:r>
+                  <a:rPr lang="de-DE" sz="3600" b="1" dirty="0">
+                    <a:solidFill>
+                      <a:schemeClr val="tx1"/>
+                    </a:solidFill>
+                    <a:ea typeface="ＭＳ Ｐゴシック" pitchFamily="124" charset="-128"/>
+                  </a:rPr>
+                  <a:t>[a]	</a:t>
+                </a:r>
+                <a:r>
+                  <a:rPr lang="de-DE" sz="3600" dirty="0">
+                    <a:solidFill>
+                      <a:schemeClr val="tx1"/>
+                    </a:solidFill>
+                    <a:ea typeface="ＭＳ Ｐゴシック" pitchFamily="124" charset="-128"/>
+                  </a:rPr>
+                  <a:t>Relative Feuchte</a:t>
+                </a:r>
+                <a:endParaRPr lang="de-DE" sz="3600" b="1" dirty="0">
+                  <a:solidFill>
+                    <a:schemeClr val="tx1"/>
+                  </a:solidFill>
+                  <a:ea typeface="ＭＳ Ｐゴシック" pitchFamily="124" charset="-128"/>
+                </a:endParaRPr>
+              </a:p>
+              <a:p>
+                <a:pPr algn="just"/>
+                <a:r>
+                  <a:rPr lang="de-DE" sz="3600" b="1" dirty="0">
+                    <a:solidFill>
+                      <a:schemeClr val="tx1"/>
+                    </a:solidFill>
+                    <a:ea typeface="ＭＳ Ｐゴシック" pitchFamily="124" charset="-128"/>
+                  </a:rPr>
+                  <a:t>	[b]	</a:t>
+                </a:r>
+                <a:r>
+                  <a:rPr lang="de-DE" sz="3600" dirty="0">
+                    <a:solidFill>
+                      <a:schemeClr val="tx1"/>
+                    </a:solidFill>
+                    <a:ea typeface="ＭＳ Ｐゴシック" pitchFamily="124" charset="-128"/>
+                  </a:rPr>
+                  <a:t>Spezifische Feuchte</a:t>
+                </a:r>
+              </a:p>
+              <a:p>
+                <a:pPr algn="just"/>
+                <a:r>
+                  <a:rPr lang="de-DE" sz="3600" dirty="0">
+                    <a:solidFill>
+                      <a:schemeClr val="tx1"/>
+                    </a:solidFill>
+                    <a:ea typeface="ＭＳ Ｐゴシック" pitchFamily="124" charset="-128"/>
+                  </a:rPr>
+                  <a:t>	</a:t>
+                </a:r>
+                <a:r>
+                  <a:rPr lang="de-DE" sz="3600" b="1" dirty="0">
+                    <a:solidFill>
+                      <a:schemeClr val="tx1"/>
+                    </a:solidFill>
+                    <a:ea typeface="ＭＳ Ｐゴシック" pitchFamily="124" charset="-128"/>
+                  </a:rPr>
+                  <a:t>[c]</a:t>
+                </a:r>
+                <a:r>
+                  <a:rPr lang="de-DE" sz="3600" dirty="0">
+                    <a:solidFill>
+                      <a:schemeClr val="tx1"/>
+                    </a:solidFill>
+                    <a:ea typeface="ＭＳ Ｐゴシック" pitchFamily="124" charset="-128"/>
+                  </a:rPr>
+                  <a:t>	Potentielle Temperatur</a:t>
+                </a:r>
+                <a:endParaRPr lang="de-DE" sz="3600" b="1" dirty="0">
+                  <a:solidFill>
+                    <a:schemeClr val="tx1"/>
+                  </a:solidFill>
+                  <a:ea typeface="ＭＳ Ｐゴシック" pitchFamily="124" charset="-128"/>
+                </a:endParaRPr>
+              </a:p>
+              <a:p>
+                <a:pPr algn="just"/>
+                <a:r>
+                  <a:rPr lang="de-DE" sz="3600" b="1" dirty="0">
+                    <a:solidFill>
+                      <a:schemeClr val="tx1"/>
+                    </a:solidFill>
+                    <a:ea typeface="ＭＳ Ｐゴシック" pitchFamily="124" charset="-128"/>
+                  </a:rPr>
+                  <a:t>	[d]	</a:t>
+                </a:r>
+                <a:r>
+                  <a:rPr lang="de-DE" sz="3600" dirty="0">
+                    <a:solidFill>
+                      <a:schemeClr val="tx1"/>
+                    </a:solidFill>
+                    <a:ea typeface="ＭＳ Ｐゴシック" pitchFamily="124" charset="-128"/>
+                  </a:rPr>
+                  <a:t>Pseudopotentielle Temperatur</a:t>
+                </a:r>
+                <a:endParaRPr lang="de-DE" sz="3600" b="1" dirty="0">
+                  <a:solidFill>
+                    <a:schemeClr val="tx1"/>
+                  </a:solidFill>
+                  <a:ea typeface="ＭＳ Ｐゴシック" pitchFamily="124" charset="-128"/>
+                </a:endParaRPr>
+              </a:p>
+              <a:p>
+                <a:pPr algn="just"/>
+                <a:endParaRPr lang="de-DE" sz="3600" dirty="0">
+                  <a:solidFill>
+                    <a:schemeClr val="tx1"/>
+                  </a:solidFill>
+                  <a:ea typeface="ＭＳ Ｐゴシック" pitchFamily="124" charset="-128"/>
+                </a:endParaRPr>
+              </a:p>
+              <a:p>
+                <a:pPr algn="just"/>
+                <a:r>
+                  <a:rPr lang="de-DE" sz="3600" dirty="0">
+                    <a:solidFill>
+                      <a:schemeClr val="tx1"/>
+                    </a:solidFill>
+                    <a:ea typeface="ＭＳ Ｐゴシック" pitchFamily="124" charset="-128"/>
+                  </a:rPr>
+                  <a:t>Zur Bestimmung der Grenzschichthöhe</a:t>
+                </a:r>
+                <a14:m>
+                  <m:oMath xmlns:m="http://schemas.openxmlformats.org/officeDocument/2006/math">
+                    <m:sSub>
+                      <m:sSubPr>
+                        <m:ctrlPr>
+                          <a:rPr lang="de-DE" sz="3600" i="1">
+                            <a:latin typeface="Cambria Math" panose="02040503050406030204" pitchFamily="18" charset="0"/>
+                          </a:rPr>
+                        </m:ctrlPr>
+                      </m:sSubPr>
+                      <m:e>
+                        <m:r>
+                          <a:rPr lang="de-DE" sz="3600" i="1">
+                            <a:latin typeface="Cambria Math" panose="02040503050406030204" pitchFamily="18" charset="0"/>
+                          </a:rPr>
+                          <m:t>𝑧</m:t>
+                        </m:r>
+                      </m:e>
+                      <m:sub>
+                        <m:r>
+                          <a:rPr lang="de-DE" sz="3600" i="1">
+                            <a:latin typeface="Cambria Math" panose="02040503050406030204" pitchFamily="18" charset="0"/>
+                          </a:rPr>
+                          <m:t>𝐺𝑆</m:t>
+                        </m:r>
+                      </m:sub>
+                    </m:sSub>
+                  </m:oMath>
+                </a14:m>
+                <a:r>
+                  <a:rPr lang="de-DE" sz="3600" dirty="0">
+                    <a:solidFill>
+                      <a:schemeClr val="tx1"/>
+                    </a:solidFill>
+                    <a:ea typeface="ＭＳ Ｐゴシック" pitchFamily="124" charset="-128"/>
+                  </a:rPr>
+                  <a:t>wurde der vertikale Gradient dieser Größen</a:t>
+                </a:r>
+                <a:r>
+                  <a:rPr lang="de-DE" sz="3600" dirty="0"/>
+                  <a:t> </a:t>
+                </a:r>
+                <a14:m>
+                  <m:oMath xmlns:m="http://schemas.openxmlformats.org/officeDocument/2006/math">
+                    <m:r>
+                      <a:rPr lang="de-DE" sz="3600" i="1">
+                        <a:latin typeface="Cambria Math" panose="02040503050406030204" pitchFamily="18" charset="0"/>
+                      </a:rPr>
+                      <m:t>𝑥</m:t>
+                    </m:r>
+                    <m:r>
+                      <a:rPr lang="de-DE" sz="3600" i="1">
+                        <a:latin typeface="Cambria Math" panose="02040503050406030204" pitchFamily="18" charset="0"/>
+                      </a:rPr>
+                      <m:t> </m:t>
+                    </m:r>
+                  </m:oMath>
+                </a14:m>
+                <a:r>
+                  <a:rPr lang="de-DE" sz="3600" dirty="0">
+                    <a:solidFill>
+                      <a:schemeClr val="tx1"/>
+                    </a:solidFill>
+                    <a:ea typeface="ＭＳ Ｐゴシック" pitchFamily="124" charset="-128"/>
+                  </a:rPr>
+                  <a:t>berechnet und die Höhe ermittelt, in der Betrag des Gradienten maximal ist:</a:t>
+                </a:r>
+              </a:p>
+              <a:p>
+                <a:pPr algn="ctr"/>
+                <a14:m>
+                  <m:oMath xmlns:m="http://schemas.openxmlformats.org/officeDocument/2006/math">
+                    <m:sSub>
+                      <m:sSubPr>
+                        <m:ctrlPr>
+                          <a:rPr lang="de-DE" sz="4400" i="1"/>
+                        </m:ctrlPr>
+                      </m:sSubPr>
+                      <m:e>
+                        <m:r>
+                          <a:rPr lang="de-DE" sz="4400" i="1"/>
+                          <m:t>𝑧</m:t>
+                        </m:r>
+                      </m:e>
+                      <m:sub>
+                        <m:r>
+                          <a:rPr lang="de-DE" sz="4400" i="1"/>
+                          <m:t>𝐺𝑆</m:t>
+                        </m:r>
+                      </m:sub>
+                    </m:sSub>
+                    <m:r>
+                      <a:rPr lang="de-DE" sz="4400" i="1"/>
+                      <m:t>=</m:t>
+                    </m:r>
+                    <m:r>
+                      <a:rPr lang="de-DE" sz="4400" i="1"/>
+                      <m:t>𝑧</m:t>
+                    </m:r>
+                    <m:r>
+                      <a:rPr lang="de-DE" sz="4400" i="1"/>
+                      <m:t>[ </m:t>
+                    </m:r>
+                    <m:r>
+                      <m:rPr>
+                        <m:sty m:val="p"/>
+                      </m:rPr>
+                      <a:rPr lang="de-DE" sz="4400"/>
+                      <m:t>max</m:t>
+                    </m:r>
+                    <m:r>
+                      <a:rPr lang="de-DE" sz="4400" i="1"/>
+                      <m:t>( </m:t>
+                    </m:r>
+                    <m:sSub>
+                      <m:sSubPr>
+                        <m:ctrlPr>
+                          <a:rPr lang="de-DE" sz="4400" i="1"/>
+                        </m:ctrlPr>
+                      </m:sSubPr>
+                      <m:e>
+                        <m:r>
+                          <m:rPr>
+                            <m:sty m:val="p"/>
+                          </m:rPr>
+                          <a:rPr lang="de-DE" sz="4400"/>
+                          <m:t>grad</m:t>
+                        </m:r>
+                      </m:e>
+                      <m:sub>
+                        <m:r>
+                          <a:rPr lang="de-DE" sz="4400" i="1"/>
+                          <m:t>𝑧</m:t>
+                        </m:r>
+                      </m:sub>
+                    </m:sSub>
+                    <m:r>
+                      <a:rPr lang="de-DE" sz="4400" i="1"/>
+                      <m:t>(</m:t>
+                    </m:r>
+                    <m:r>
+                      <a:rPr lang="de-DE" sz="4400" i="1"/>
+                      <m:t>𝑥</m:t>
+                    </m:r>
+                    <m:r>
+                      <a:rPr lang="de-DE" sz="4400" i="1"/>
+                      <m:t>) ) </m:t>
+                    </m:r>
+                  </m:oMath>
+                </a14:m>
+                <a:r>
+                  <a:rPr lang="de-DE" sz="4400" dirty="0"/>
+                  <a:t>]</a:t>
+                </a:r>
+              </a:p>
+              <a:p>
+                <a:pPr algn="just"/>
+                <a:endParaRPr lang="de-DE" sz="3600" dirty="0">
+                  <a:solidFill>
+                    <a:schemeClr val="tx1"/>
+                  </a:solidFill>
+                  <a:ea typeface="ＭＳ Ｐゴシック" pitchFamily="124" charset="-128"/>
+                </a:endParaRPr>
+              </a:p>
+              <a:p>
+                <a:pPr algn="just"/>
+                <a:r>
+                  <a:rPr lang="de-DE" sz="3600" dirty="0">
+                    <a:solidFill>
+                      <a:schemeClr val="tx1"/>
+                    </a:solidFill>
+                    <a:ea typeface="ＭＳ Ｐゴシック" pitchFamily="124" charset="-128"/>
+                  </a:rPr>
+                  <a:t>Innerhalb der Grenzschicht ist die Atmosphäre aufgrund von Turbulenz gut durchmischt, sodass vertikale Gradienten der Feuchte und potentiellen Temperatur dort klein sind. Da kaum Durchmischung zwischen Grenzschicht und der darüberliegenden freien Atmosphäre stattfindet, unterscheiden sich Feuchte und potentielle Temperatur der beiden Schichten meist stark. Am Übergang sind deshalb große Gradienten zu erwarten.</a:t>
+                </a:r>
+              </a:p>
+              <a:p>
+                <a:endParaRPr lang="de-DE" sz="3600" dirty="0">
+                  <a:solidFill>
+                    <a:schemeClr val="tx1"/>
+                  </a:solidFill>
+                  <a:ea typeface="ＭＳ Ｐゴシック" pitchFamily="124" charset="-128"/>
+                </a:endParaRPr>
+              </a:p>
+              <a:p>
+                <a:endParaRPr lang="de-DE" sz="3600" dirty="0">
+                  <a:solidFill>
+                    <a:schemeClr val="tx1"/>
+                  </a:solidFill>
+                  <a:ea typeface="ＭＳ Ｐゴシック" pitchFamily="124" charset="-128"/>
+                </a:endParaRPr>
+              </a:p>
+            </p:txBody>
+          </p:sp>
+        </mc:Choice>
+        <mc:Fallback>
+          <p:sp>
+            <p:nvSpPr>
+              <p:cNvPr id="30" name="Rechteck 29">
+                <a:extLst>
+                  <a:ext uri="{FF2B5EF4-FFF2-40B4-BE49-F238E27FC236}">
+                    <a16:creationId xmlns:a16="http://schemas.microsoft.com/office/drawing/2014/main" id="{00F2F1BC-0D66-45C0-8E9C-5464DBC9DD37}"/>
+                  </a:ext>
+                </a:extLst>
+              </p:cNvPr>
+              <p:cNvSpPr>
+                <a:spLocks noRot="1" noChangeAspect="1" noMove="1" noResize="1" noEditPoints="1" noAdjustHandles="1" noChangeArrowheads="1" noChangeShapeType="1" noTextEdit="1"/>
+              </p:cNvSpPr>
+              <p:nvPr/>
+            </p:nvSpPr>
+            <p:spPr>
+              <a:xfrm>
+                <a:off x="1456085" y="12403767"/>
+                <a:ext cx="14329593" cy="12649617"/>
+              </a:xfrm>
+              <a:prstGeom prst="rect">
+                <a:avLst/>
+              </a:prstGeom>
+              <a:blipFill>
+                <a:blip r:embed="rId12"/>
+                <a:stretch>
+                  <a:fillRect l="-1744" t="-1060" r="-1276"/>
+                </a:stretch>
+              </a:blipFill>
+            </p:spPr>
+            <p:txBody>
+              <a:bodyPr/>
+              <a:lstStyle/>
+              <a:p>
+                <a:r>
+                  <a:rPr lang="de-DE">
+                    <a:noFill/>
+                  </a:rPr>
+                  <a:t> </a:t>
+                </a:r>
+              </a:p>
+            </p:txBody>
+          </p:sp>
+        </mc:Fallback>
+      </mc:AlternateContent>
       <p:sp>
         <p:nvSpPr>
           <p:cNvPr id="31" name="Rechteck 30">
@@ -3473,6 +3877,162 @@
                 <a:ea typeface="ＭＳ Ｐゴシック" pitchFamily="124" charset="-128"/>
               </a:rPr>
               <a:t>Fazit</a:t>
+            </a:r>
+          </a:p>
+        </p:txBody>
+      </p:sp>
+      <p:sp>
+        <p:nvSpPr>
+          <p:cNvPr id="3" name="Textfeld 2">
+            <a:extLst>
+              <a:ext uri="{FF2B5EF4-FFF2-40B4-BE49-F238E27FC236}">
+                <a16:creationId xmlns:a16="http://schemas.microsoft.com/office/drawing/2014/main" id="{C482370A-031D-490B-BB61-52320A1D9812}"/>
+              </a:ext>
+            </a:extLst>
+          </p:cNvPr>
+          <p:cNvSpPr txBox="1"/>
+          <p:nvPr/>
+        </p:nvSpPr>
+        <p:spPr>
+          <a:xfrm>
+            <a:off x="26586878" y="7648353"/>
+            <a:ext cx="1080120" cy="1015663"/>
+          </a:xfrm>
+          <a:prstGeom prst="rect">
+            <a:avLst/>
+          </a:prstGeom>
+          <a:noFill/>
+        </p:spPr>
+        <p:txBody>
+          <a:bodyPr wrap="square" rtlCol="0">
+            <a:spAutoFit/>
+          </a:bodyPr>
+          <a:lstStyle/>
+          <a:p>
+            <a:r>
+              <a:rPr lang="de-DE" sz="6000" dirty="0">
+                <a:solidFill>
+                  <a:srgbClr val="FF0000"/>
+                </a:solidFill>
+              </a:rPr>
+              <a:t>[a]</a:t>
+            </a:r>
+          </a:p>
+        </p:txBody>
+      </p:sp>
+      <p:sp>
+        <p:nvSpPr>
+          <p:cNvPr id="37" name="Textfeld 36">
+            <a:extLst>
+              <a:ext uri="{FF2B5EF4-FFF2-40B4-BE49-F238E27FC236}">
+                <a16:creationId xmlns:a16="http://schemas.microsoft.com/office/drawing/2014/main" id="{1BDCF4C2-C577-4A16-8F54-B79D596CC1EA}"/>
+              </a:ext>
+            </a:extLst>
+          </p:cNvPr>
+          <p:cNvSpPr txBox="1"/>
+          <p:nvPr/>
+        </p:nvSpPr>
+        <p:spPr>
+          <a:xfrm>
+            <a:off x="26586878" y="11536785"/>
+            <a:ext cx="1080120" cy="1015663"/>
+          </a:xfrm>
+          <a:prstGeom prst="rect">
+            <a:avLst/>
+          </a:prstGeom>
+          <a:noFill/>
+        </p:spPr>
+        <p:txBody>
+          <a:bodyPr wrap="square" rtlCol="0">
+            <a:spAutoFit/>
+          </a:bodyPr>
+          <a:lstStyle/>
+          <a:p>
+            <a:r>
+              <a:rPr lang="de-DE" sz="6000" dirty="0">
+                <a:solidFill>
+                  <a:srgbClr val="FF0000"/>
+                </a:solidFill>
+              </a:rPr>
+              <a:t>[b]</a:t>
+            </a:r>
+          </a:p>
+        </p:txBody>
+      </p:sp>
+      <p:sp>
+        <p:nvSpPr>
+          <p:cNvPr id="38" name="Textfeld 37">
+            <a:extLst>
+              <a:ext uri="{FF2B5EF4-FFF2-40B4-BE49-F238E27FC236}">
+                <a16:creationId xmlns:a16="http://schemas.microsoft.com/office/drawing/2014/main" id="{6334D7CE-714E-44A6-A1F0-EBAEBE3BBE04}"/>
+              </a:ext>
+            </a:extLst>
+          </p:cNvPr>
+          <p:cNvSpPr txBox="1"/>
+          <p:nvPr/>
+        </p:nvSpPr>
+        <p:spPr>
+          <a:xfrm>
+            <a:off x="26586878" y="15569233"/>
+            <a:ext cx="1080120" cy="1015663"/>
+          </a:xfrm>
+          <a:prstGeom prst="rect">
+            <a:avLst/>
+          </a:prstGeom>
+          <a:noFill/>
+        </p:spPr>
+        <p:txBody>
+          <a:bodyPr wrap="square" rtlCol="0">
+            <a:spAutoFit/>
+          </a:bodyPr>
+          <a:lstStyle/>
+          <a:p>
+            <a:r>
+              <a:rPr lang="de-DE" sz="6000" dirty="0">
+                <a:solidFill>
+                  <a:srgbClr val="FF0000"/>
+                </a:solidFill>
+              </a:rPr>
+              <a:t>[c]</a:t>
+            </a:r>
+          </a:p>
+        </p:txBody>
+      </p:sp>
+      <p:sp>
+        <p:nvSpPr>
+          <p:cNvPr id="39" name="Textfeld 38">
+            <a:extLst>
+              <a:ext uri="{FF2B5EF4-FFF2-40B4-BE49-F238E27FC236}">
+                <a16:creationId xmlns:a16="http://schemas.microsoft.com/office/drawing/2014/main" id="{0FF17D11-5160-48B3-AB85-3507E70DDA64}"/>
+              </a:ext>
+            </a:extLst>
+          </p:cNvPr>
+          <p:cNvSpPr txBox="1"/>
+          <p:nvPr/>
+        </p:nvSpPr>
+        <p:spPr>
+          <a:xfrm>
+            <a:off x="26586878" y="19666138"/>
+            <a:ext cx="1080120" cy="1015663"/>
+          </a:xfrm>
+          <a:prstGeom prst="rect">
+            <a:avLst/>
+          </a:prstGeom>
+          <a:noFill/>
+        </p:spPr>
+        <p:txBody>
+          <a:bodyPr wrap="square" rtlCol="0">
+            <a:spAutoFit/>
+          </a:bodyPr>
+          <a:lstStyle/>
+          <a:p>
+            <a:r>
+              <a:rPr lang="de-DE" sz="6000" dirty="0">
+                <a:solidFill>
+                  <a:srgbClr val="FF0000"/>
+                </a:solidFill>
+              </a:rPr>
+              <a:t>[d]</a:t>
             </a:r>
           </a:p>
         </p:txBody>

</xml_diff>

<commit_message>
Added some more plots
</commit_message>
<xml_diff>
--- a/poster/lex2018_poster_Grenzschichthöhe2.pptx
+++ b/poster/lex2018_poster_Grenzschichthöhe2.pptx
@@ -295,7 +295,7 @@
               <a:pPr>
                 <a:defRPr/>
               </a:pPr>
-              <a:t>18.09.2018</a:t>
+              <a:t>20.09.2018</a:t>
             </a:fld>
             <a:endParaRPr lang="de-DE"/>
           </a:p>
@@ -598,7 +598,7 @@
               <a14:shadowObscured xmlns:a14="http://schemas.microsoft.com/office/drawing/2010/main" val="1"/>
             </a:ext>
             <a:ext uri="{FAA26D3D-D897-4be2-8F04-BA451C77F1D7}">
-              <ma14:placeholderFlag xmlns:ma14="http://schemas.microsoft.com/office/mac/drawingml/2011/main" xmlns="" val="1"/>
+              <ma14:placeholderFlag xmlns="" xmlns:ma14="http://schemas.microsoft.com/office/mac/drawingml/2011/main" val="1"/>
             </a:ext>
           </a:extLst>
         </p:spPr>
@@ -1148,7 +1148,7 @@
           <a:noFill/>
           <a:extLst>
             <a:ext uri="{FAA26D3D-D897-4be2-8F04-BA451C77F1D7}">
-              <ma14:placeholderFlag xmlns:ma14="http://schemas.microsoft.com/office/mac/drawingml/2011/main" xmlns="" val="1"/>
+              <ma14:placeholderFlag xmlns="" xmlns:ma14="http://schemas.microsoft.com/office/mac/drawingml/2011/main" val="1"/>
             </a:ext>
           </a:extLst>
         </p:spPr>
@@ -1892,6 +1892,182 @@
       </p:grpSpPr>
       <p:pic>
         <p:nvPicPr>
+          <p:cNvPr id="46" name="Grafik 45">
+            <a:extLst>
+              <a:ext uri="{FF2B5EF4-FFF2-40B4-BE49-F238E27FC236}">
+                <a16:creationId xmlns:a16="http://schemas.microsoft.com/office/drawing/2014/main" id="{0F071C14-9AB0-4E21-B7E2-45094DF55A7F}"/>
+              </a:ext>
+            </a:extLst>
+          </p:cNvPr>
+          <p:cNvPicPr>
+            <a:picLocks noChangeAspect="1"/>
+          </p:cNvPicPr>
+          <p:nvPr/>
+        </p:nvPicPr>
+        <p:blipFill>
+          <a:blip r:embed="rId3" cstate="email">
+            <a:extLst>
+              <a:ext uri="{28A0092B-C50C-407E-A947-70E740481C1C}">
+                <a14:useLocalDpi xmlns:a14="http://schemas.microsoft.com/office/drawing/2010/main" val="0"/>
+              </a:ext>
+            </a:extLst>
+          </a:blip>
+          <a:stretch>
+            <a:fillRect/>
+          </a:stretch>
+        </p:blipFill>
+        <p:spPr>
+          <a:xfrm>
+            <a:off x="780975" y="25810030"/>
+            <a:ext cx="11195564" cy="4500000"/>
+          </a:xfrm>
+          <a:prstGeom prst="rect">
+            <a:avLst/>
+          </a:prstGeom>
+        </p:spPr>
+      </p:pic>
+      <p:pic>
+        <p:nvPicPr>
+          <p:cNvPr id="42" name="Grafik 41">
+            <a:extLst>
+              <a:ext uri="{FF2B5EF4-FFF2-40B4-BE49-F238E27FC236}">
+                <a16:creationId xmlns:a16="http://schemas.microsoft.com/office/drawing/2014/main" id="{4B1DE1F6-11B0-40C1-A4B8-E15A8BDAA33B}"/>
+              </a:ext>
+            </a:extLst>
+          </p:cNvPr>
+          <p:cNvPicPr>
+            <a:picLocks noChangeAspect="1"/>
+          </p:cNvPicPr>
+          <p:nvPr/>
+        </p:nvPicPr>
+        <p:blipFill rotWithShape="1">
+          <a:blip r:embed="rId4" cstate="email">
+            <a:extLst>
+              <a:ext uri="{28A0092B-C50C-407E-A947-70E740481C1C}">
+                <a14:useLocalDpi xmlns:a14="http://schemas.microsoft.com/office/drawing/2010/main" val="0"/>
+              </a:ext>
+            </a:extLst>
+          </a:blip>
+          <a:srcRect t="4751" b="4773"/>
+          <a:stretch/>
+        </p:blipFill>
+        <p:spPr>
+          <a:xfrm>
+            <a:off x="18209754" y="17297425"/>
+            <a:ext cx="12193548" cy="3419959"/>
+          </a:xfrm>
+          <a:prstGeom prst="rect">
+            <a:avLst/>
+          </a:prstGeom>
+        </p:spPr>
+      </p:pic>
+      <p:pic>
+        <p:nvPicPr>
+          <p:cNvPr id="19" name="Grafik 18">
+            <a:extLst>
+              <a:ext uri="{FF2B5EF4-FFF2-40B4-BE49-F238E27FC236}">
+                <a16:creationId xmlns:a16="http://schemas.microsoft.com/office/drawing/2014/main" id="{C64CD5DA-027A-436F-BB33-5FEDAAC0EA66}"/>
+              </a:ext>
+            </a:extLst>
+          </p:cNvPr>
+          <p:cNvPicPr>
+            <a:picLocks noChangeAspect="1"/>
+          </p:cNvPicPr>
+          <p:nvPr/>
+        </p:nvPicPr>
+        <p:blipFill rotWithShape="1">
+          <a:blip r:embed="rId5" cstate="email">
+            <a:extLst>
+              <a:ext uri="{28A0092B-C50C-407E-A947-70E740481C1C}">
+                <a14:useLocalDpi xmlns:a14="http://schemas.microsoft.com/office/drawing/2010/main" val="0"/>
+              </a:ext>
+            </a:extLst>
+          </a:blip>
+          <a:srcRect t="4345" b="7071"/>
+          <a:stretch/>
+        </p:blipFill>
+        <p:spPr>
+          <a:xfrm>
+            <a:off x="18281760" y="7092505"/>
+            <a:ext cx="12193550" cy="3348478"/>
+          </a:xfrm>
+          <a:prstGeom prst="rect">
+            <a:avLst/>
+          </a:prstGeom>
+        </p:spPr>
+      </p:pic>
+      <p:pic>
+        <p:nvPicPr>
+          <p:cNvPr id="40" name="Grafik 39">
+            <a:extLst>
+              <a:ext uri="{FF2B5EF4-FFF2-40B4-BE49-F238E27FC236}">
+                <a16:creationId xmlns:a16="http://schemas.microsoft.com/office/drawing/2014/main" id="{43F77D3F-B640-41BC-AD39-B897E1D9F05A}"/>
+              </a:ext>
+            </a:extLst>
+          </p:cNvPr>
+          <p:cNvPicPr>
+            <a:picLocks noChangeAspect="1"/>
+          </p:cNvPicPr>
+          <p:nvPr/>
+        </p:nvPicPr>
+        <p:blipFill rotWithShape="1">
+          <a:blip r:embed="rId6" cstate="email">
+            <a:extLst>
+              <a:ext uri="{28A0092B-C50C-407E-A947-70E740481C1C}">
+                <a14:useLocalDpi xmlns:a14="http://schemas.microsoft.com/office/drawing/2010/main" val="0"/>
+              </a:ext>
+            </a:extLst>
+          </a:blip>
+          <a:srcRect t="5495" b="6656"/>
+          <a:stretch/>
+        </p:blipFill>
+        <p:spPr>
+          <a:xfrm>
+            <a:off x="18209754" y="13913049"/>
+            <a:ext cx="12193548" cy="3320696"/>
+          </a:xfrm>
+          <a:prstGeom prst="rect">
+            <a:avLst/>
+          </a:prstGeom>
+        </p:spPr>
+      </p:pic>
+      <p:pic>
+        <p:nvPicPr>
+          <p:cNvPr id="21" name="Grafik 20">
+            <a:extLst>
+              <a:ext uri="{FF2B5EF4-FFF2-40B4-BE49-F238E27FC236}">
+                <a16:creationId xmlns:a16="http://schemas.microsoft.com/office/drawing/2014/main" id="{976740B1-6D9C-4E1B-B8B3-A8B6E0F15E07}"/>
+              </a:ext>
+            </a:extLst>
+          </p:cNvPr>
+          <p:cNvPicPr>
+            <a:picLocks noChangeAspect="1"/>
+          </p:cNvPicPr>
+          <p:nvPr/>
+        </p:nvPicPr>
+        <p:blipFill rotWithShape="1">
+          <a:blip r:embed="rId7" cstate="email">
+            <a:extLst>
+              <a:ext uri="{28A0092B-C50C-407E-A947-70E740481C1C}">
+                <a14:useLocalDpi xmlns:a14="http://schemas.microsoft.com/office/drawing/2010/main" val="0"/>
+              </a:ext>
+            </a:extLst>
+          </a:blip>
+          <a:srcRect t="4455" b="5914"/>
+          <a:stretch/>
+        </p:blipFill>
+        <p:spPr>
+          <a:xfrm>
+            <a:off x="18209754" y="10456665"/>
+            <a:ext cx="12193548" cy="3388081"/>
+          </a:xfrm>
+          <a:prstGeom prst="rect">
+            <a:avLst/>
+          </a:prstGeom>
+        </p:spPr>
+      </p:pic>
+      <p:pic>
+        <p:nvPicPr>
           <p:cNvPr id="36" name="Grafik 35">
             <a:extLst>
               <a:ext uri="{FF2B5EF4-FFF2-40B4-BE49-F238E27FC236}">
@@ -1905,7 +2081,7 @@
           <p:nvPr/>
         </p:nvPicPr>
         <p:blipFill>
-          <a:blip r:embed="rId3" cstate="email">
+          <a:blip r:embed="rId8" cstate="email">
             <a:extLst>
               <a:ext uri="{28A0092B-C50C-407E-A947-70E740481C1C}">
                 <a14:useLocalDpi xmlns:a14="http://schemas.microsoft.com/office/drawing/2010/main" val="0"/>
@@ -1993,7 +2169,7 @@
           <p:nvPr/>
         </p:nvPicPr>
         <p:blipFill>
-          <a:blip r:embed="rId4"/>
+          <a:blip r:embed="rId9"/>
           <a:stretch>
             <a:fillRect/>
           </a:stretch>
@@ -2991,186 +3167,6 @@
       </p:sp>
       <p:pic>
         <p:nvPicPr>
-          <p:cNvPr id="10" name="Grafik 9">
-            <a:extLst>
-              <a:ext uri="{FF2B5EF4-FFF2-40B4-BE49-F238E27FC236}">
-                <a16:creationId xmlns:a16="http://schemas.microsoft.com/office/drawing/2014/main" id="{921B0CFD-BEFB-4EF4-8BE1-796192787D5F}"/>
-              </a:ext>
-            </a:extLst>
-          </p:cNvPr>
-          <p:cNvPicPr>
-            <a:picLocks noChangeAspect="1"/>
-          </p:cNvPicPr>
-          <p:nvPr/>
-        </p:nvPicPr>
-        <p:blipFill>
-          <a:blip r:embed="rId5" cstate="email">
-            <a:extLst>
-              <a:ext uri="{28A0092B-C50C-407E-A947-70E740481C1C}">
-                <a14:useLocalDpi xmlns:a14="http://schemas.microsoft.com/office/drawing/2010/main" val="0"/>
-              </a:ext>
-            </a:extLst>
-          </a:blip>
-          <a:stretch>
-            <a:fillRect/>
-          </a:stretch>
-        </p:blipFill>
-        <p:spPr>
-          <a:xfrm>
-            <a:off x="16816029" y="7019640"/>
-            <a:ext cx="13875305" cy="4284000"/>
-          </a:xfrm>
-          <a:prstGeom prst="rect">
-            <a:avLst/>
-          </a:prstGeom>
-        </p:spPr>
-      </p:pic>
-      <p:pic>
-        <p:nvPicPr>
-          <p:cNvPr id="14" name="Grafik 13">
-            <a:extLst>
-              <a:ext uri="{FF2B5EF4-FFF2-40B4-BE49-F238E27FC236}">
-                <a16:creationId xmlns:a16="http://schemas.microsoft.com/office/drawing/2014/main" id="{8B0E7DFF-3ECF-4453-85B4-8F9334377984}"/>
-              </a:ext>
-            </a:extLst>
-          </p:cNvPr>
-          <p:cNvPicPr>
-            <a:picLocks noChangeAspect="1"/>
-          </p:cNvPicPr>
-          <p:nvPr/>
-        </p:nvPicPr>
-        <p:blipFill>
-          <a:blip r:embed="rId6" cstate="email">
-            <a:extLst>
-              <a:ext uri="{28A0092B-C50C-407E-A947-70E740481C1C}">
-                <a14:useLocalDpi xmlns:a14="http://schemas.microsoft.com/office/drawing/2010/main" val="0"/>
-              </a:ext>
-            </a:extLst>
-          </a:blip>
-          <a:stretch>
-            <a:fillRect/>
-          </a:stretch>
-        </p:blipFill>
-        <p:spPr>
-          <a:xfrm>
-            <a:off x="16744021" y="11069209"/>
-            <a:ext cx="13875305" cy="4284000"/>
-          </a:xfrm>
-          <a:prstGeom prst="rect">
-            <a:avLst/>
-          </a:prstGeom>
-        </p:spPr>
-      </p:pic>
-      <p:pic>
-        <p:nvPicPr>
-          <p:cNvPr id="16" name="Grafik 15">
-            <a:extLst>
-              <a:ext uri="{FF2B5EF4-FFF2-40B4-BE49-F238E27FC236}">
-                <a16:creationId xmlns:a16="http://schemas.microsoft.com/office/drawing/2014/main" id="{D5869E4B-C62B-460B-8D9E-34A51B0735F3}"/>
-              </a:ext>
-            </a:extLst>
-          </p:cNvPr>
-          <p:cNvPicPr>
-            <a:picLocks noChangeAspect="1"/>
-          </p:cNvPicPr>
-          <p:nvPr/>
-        </p:nvPicPr>
-        <p:blipFill>
-          <a:blip r:embed="rId7" cstate="email">
-            <a:extLst>
-              <a:ext uri="{28A0092B-C50C-407E-A947-70E740481C1C}">
-                <a14:useLocalDpi xmlns:a14="http://schemas.microsoft.com/office/drawing/2010/main" val="0"/>
-              </a:ext>
-            </a:extLst>
-          </a:blip>
-          <a:stretch>
-            <a:fillRect/>
-          </a:stretch>
-        </p:blipFill>
-        <p:spPr>
-          <a:xfrm>
-            <a:off x="16744021" y="15137185"/>
-            <a:ext cx="13875305" cy="4284000"/>
-          </a:xfrm>
-          <a:prstGeom prst="rect">
-            <a:avLst/>
-          </a:prstGeom>
-        </p:spPr>
-      </p:pic>
-      <p:pic>
-        <p:nvPicPr>
-          <p:cNvPr id="18" name="Grafik 17">
-            <a:extLst>
-              <a:ext uri="{FF2B5EF4-FFF2-40B4-BE49-F238E27FC236}">
-                <a16:creationId xmlns:a16="http://schemas.microsoft.com/office/drawing/2014/main" id="{B5704965-19AF-4106-ACA7-83920C944374}"/>
-              </a:ext>
-            </a:extLst>
-          </p:cNvPr>
-          <p:cNvPicPr>
-            <a:picLocks noChangeAspect="1"/>
-          </p:cNvPicPr>
-          <p:nvPr/>
-        </p:nvPicPr>
-        <p:blipFill>
-          <a:blip r:embed="rId8" cstate="email">
-            <a:extLst>
-              <a:ext uri="{28A0092B-C50C-407E-A947-70E740481C1C}">
-                <a14:useLocalDpi xmlns:a14="http://schemas.microsoft.com/office/drawing/2010/main" val="0"/>
-              </a:ext>
-            </a:extLst>
-          </a:blip>
-          <a:stretch>
-            <a:fillRect/>
-          </a:stretch>
-        </p:blipFill>
-        <p:spPr>
-          <a:xfrm>
-            <a:off x="16744021" y="19169633"/>
-            <a:ext cx="13875305" cy="4284000"/>
-          </a:xfrm>
-          <a:prstGeom prst="rect">
-            <a:avLst/>
-          </a:prstGeom>
-        </p:spPr>
-      </p:pic>
-      <p:pic>
-        <p:nvPicPr>
-          <p:cNvPr id="33" name="Grafik 32">
-            <a:extLst>
-              <a:ext uri="{FF2B5EF4-FFF2-40B4-BE49-F238E27FC236}">
-                <a16:creationId xmlns:a16="http://schemas.microsoft.com/office/drawing/2014/main" id="{BEBE852B-C134-48CA-89C5-4BED896CF045}"/>
-              </a:ext>
-            </a:extLst>
-          </p:cNvPr>
-          <p:cNvPicPr>
-            <a:picLocks noChangeAspect="1"/>
-          </p:cNvPicPr>
-          <p:nvPr/>
-        </p:nvPicPr>
-        <p:blipFill>
-          <a:blip r:embed="rId9" cstate="email">
-            <a:extLst>
-              <a:ext uri="{28A0092B-C50C-407E-A947-70E740481C1C}">
-                <a14:useLocalDpi xmlns:a14="http://schemas.microsoft.com/office/drawing/2010/main" val="0"/>
-              </a:ext>
-            </a:extLst>
-          </a:blip>
-          <a:stretch>
-            <a:fillRect/>
-          </a:stretch>
-        </p:blipFill>
-        <p:spPr>
-          <a:xfrm>
-            <a:off x="17414256" y="23274090"/>
-            <a:ext cx="10718282" cy="1286194"/>
-          </a:xfrm>
-          <a:prstGeom prst="rect">
-            <a:avLst/>
-          </a:prstGeom>
-        </p:spPr>
-      </p:pic>
-      <p:pic>
-        <p:nvPicPr>
           <p:cNvPr id="34" name="Bild 20">
             <a:extLst>
               <a:ext uri="{FF2B5EF4-FFF2-40B4-BE49-F238E27FC236}">
@@ -3298,8 +3294,8 @@
         </p:nvSpPr>
         <p:spPr>
           <a:xfrm>
-            <a:off x="1456085" y="7333442"/>
-            <a:ext cx="14329593" cy="4647426"/>
+            <a:off x="1130049" y="7261012"/>
+            <a:ext cx="16383821" cy="5139869"/>
           </a:xfrm>
           <a:prstGeom prst="rect">
             <a:avLst/>
@@ -3312,7 +3308,7 @@
           <a:lstStyle/>
           <a:p>
             <a:r>
-              <a:rPr lang="de-DE" sz="4400" b="1" dirty="0">
+              <a:rPr lang="de-DE" sz="4000" b="1" dirty="0">
                 <a:solidFill>
                   <a:srgbClr val="CB1028"/>
                 </a:solidFill>
@@ -3324,13 +3320,43 @@
           <a:p>
             <a:pPr algn="just"/>
             <a:r>
-              <a:rPr lang="de-DE" sz="3600" i="1" dirty="0">
+              <a:rPr lang="de-DE" sz="3200" i="1" dirty="0">
                 <a:solidFill>
                   <a:schemeClr val="tx1"/>
                 </a:solidFill>
                 <a:ea typeface="ＭＳ Ｐゴシック" pitchFamily="124" charset="-128"/>
               </a:rPr>
-              <a:t>Die vertikale Ausdehnung der atmosphärischen Grenzschicht spielt sowohl für die numerische Wettervorhersage als auch bei der Ausbreitung von Luftschadstoffen eine wichtige Rolle. Die ALPACAs bieten die Möglichkeit, Temperatur und Feuchte in der Grenzschicht mit hoher zeitlicher Auflösung zu messen. Wie lassen sich die gewonnenen Daten nutzen, um daraus die Höhe der Grenzschicht zu bestimmen? </a:t>
+              <a:t>Die vertikale Ausdehnung der atmosphärischen Grenzschicht spielt für viele Anwendungen eine wichtige Rolle, wie beispielsweise in der numerischen Wettervorhersage oder bei der Berechnung der Ausbreitung von Luftschadstoffen. Die ALPACAs bieten die Möglichkeit Temperatur, relative Feuchte und Druck in den untersten 500m der Atmosphäre mit hoher zeitlicher Auflösung zu messen. Folgende Fragen sollen anhand geklärt werden: </a:t>
+            </a:r>
+          </a:p>
+          <a:p>
+            <a:pPr algn="just"/>
+            <a:r>
+              <a:rPr lang="de-DE" sz="3200" b="1" i="1" dirty="0">
+                <a:solidFill>
+                  <a:schemeClr val="tx1"/>
+                </a:solidFill>
+                <a:ea typeface="ＭＳ Ｐゴシック" pitchFamily="124" charset="-128"/>
+              </a:rPr>
+              <a:t>Wie lassen sich die Daten der ALPACAs nutzen, um daraus die Höhe der Grenzschicht zu bestimmen? Stimmen die Ergebnisse mit den Messungen des </a:t>
+            </a:r>
+            <a:r>
+              <a:rPr lang="de-DE" sz="3200" b="1" i="1" dirty="0" err="1">
+                <a:solidFill>
+                  <a:schemeClr val="tx1"/>
+                </a:solidFill>
+                <a:ea typeface="ＭＳ Ｐゴシック" pitchFamily="124" charset="-128"/>
+              </a:rPr>
+              <a:t>Ceilometers</a:t>
+            </a:r>
+            <a:r>
+              <a:rPr lang="de-DE" sz="3200" b="1" i="1" dirty="0">
+                <a:solidFill>
+                  <a:schemeClr val="tx1"/>
+                </a:solidFill>
+                <a:ea typeface="ＭＳ Ｐゴシック" pitchFamily="124" charset="-128"/>
+              </a:rPr>
+              <a:t> überein? </a:t>
             </a:r>
           </a:p>
         </p:txBody>
@@ -3351,8 +3377,8 @@
             </p:nvSpPr>
             <p:spPr>
               <a:xfrm>
-                <a:off x="1456085" y="12403767"/>
-                <a:ext cx="14329593" cy="12649617"/>
+                <a:off x="1130049" y="12902599"/>
+                <a:ext cx="16383821" cy="9602629"/>
               </a:xfrm>
               <a:prstGeom prst="rect">
                 <a:avLst/>
@@ -3365,7 +3391,7 @@
               <a:lstStyle/>
               <a:p>
                 <a:r>
-                  <a:rPr lang="de-DE" sz="4400" b="1" dirty="0">
+                  <a:rPr lang="de-DE" sz="4000" b="1" dirty="0">
                     <a:solidFill>
                       <a:srgbClr val="CB1028"/>
                     </a:solidFill>
@@ -3377,28 +3403,28 @@
               <a:p>
                 <a:pPr algn="just"/>
                 <a:r>
-                  <a:rPr lang="de-DE" sz="3600" dirty="0">
+                  <a:rPr lang="de-DE" sz="3200" dirty="0">
                     <a:solidFill>
                       <a:schemeClr val="tx1"/>
                     </a:solidFill>
                     <a:ea typeface="ＭＳ Ｐゴシック" pitchFamily="124" charset="-128"/>
                   </a:rPr>
-                  <a:t>Aus folgenden Größen, die sich aus den Messungen der ALPACAs ableiten lassen, wurde die Grenzschichthöhe bestimmt:</a:t>
+                  <a:t>Zur Bestimmung der Grenzschichthöhe wurden die Vertikalprofile von vier verschiedenen Größen verwendet (Abbildung 1):</a:t>
                 </a:r>
               </a:p>
               <a:p>
                 <a:pPr algn="just"/>
                 <a:r>
-                  <a:rPr lang="de-DE" sz="3600" dirty="0">
+                  <a:rPr lang="de-DE" sz="3200" dirty="0">
                     <a:solidFill>
                       <a:schemeClr val="tx1"/>
                     </a:solidFill>
                     <a:ea typeface="ＭＳ Ｐゴシック" pitchFamily="124" charset="-128"/>
                   </a:rPr>
-                  <a:t>	</a:t>
+                  <a:t>			</a:t>
                 </a:r>
                 <a:r>
-                  <a:rPr lang="de-DE" sz="3600" b="1" dirty="0">
+                  <a:rPr lang="de-DE" sz="3200" b="1" dirty="0">
                     <a:solidFill>
                       <a:schemeClr val="tx1"/>
                     </a:solidFill>
@@ -3407,7 +3433,7 @@
                   <a:t>[a]	</a:t>
                 </a:r>
                 <a:r>
-                  <a:rPr lang="de-DE" sz="3600" dirty="0">
+                  <a:rPr lang="de-DE" sz="3200" dirty="0">
                     <a:solidFill>
                       <a:schemeClr val="tx1"/>
                     </a:solidFill>
@@ -3415,7 +3441,7 @@
                   </a:rPr>
                   <a:t>Relative Feuchte</a:t>
                 </a:r>
-                <a:endParaRPr lang="de-DE" sz="3600" b="1" dirty="0">
+                <a:endParaRPr lang="de-DE" sz="3200" b="1" dirty="0">
                   <a:solidFill>
                     <a:schemeClr val="tx1"/>
                   </a:solidFill>
@@ -3425,16 +3451,16 @@
               <a:p>
                 <a:pPr algn="just"/>
                 <a:r>
-                  <a:rPr lang="de-DE" sz="3600" b="1" dirty="0">
+                  <a:rPr lang="de-DE" sz="3200" b="1" dirty="0">
                     <a:solidFill>
                       <a:schemeClr val="tx1"/>
                     </a:solidFill>
                     <a:ea typeface="ＭＳ Ｐゴシック" pitchFamily="124" charset="-128"/>
                   </a:rPr>
-                  <a:t>	[b]	</a:t>
+                  <a:t>			[b]	</a:t>
                 </a:r>
                 <a:r>
-                  <a:rPr lang="de-DE" sz="3600" dirty="0">
+                  <a:rPr lang="de-DE" sz="3200" dirty="0">
                     <a:solidFill>
                       <a:schemeClr val="tx1"/>
                     </a:solidFill>
@@ -3446,16 +3472,16 @@
               <a:p>
                 <a:pPr algn="just"/>
                 <a:r>
-                  <a:rPr lang="de-DE" sz="3600" dirty="0">
+                  <a:rPr lang="de-DE" sz="3200" dirty="0">
                     <a:solidFill>
                       <a:schemeClr val="tx1"/>
                     </a:solidFill>
                     <a:ea typeface="ＭＳ Ｐゴシック" pitchFamily="124" charset="-128"/>
                   </a:rPr>
-                  <a:t>	</a:t>
+                  <a:t>			</a:t>
                 </a:r>
                 <a:r>
-                  <a:rPr lang="de-DE" sz="3600" b="1" dirty="0">
+                  <a:rPr lang="de-DE" sz="3200" b="1" dirty="0">
                     <a:solidFill>
                       <a:schemeClr val="tx1"/>
                     </a:solidFill>
@@ -3464,7 +3490,7 @@
                   <a:t>[c]</a:t>
                 </a:r>
                 <a:r>
-                  <a:rPr lang="de-DE" sz="3600" dirty="0">
+                  <a:rPr lang="de-DE" sz="3200" dirty="0">
                     <a:solidFill>
                       <a:schemeClr val="tx1"/>
                     </a:solidFill>
@@ -3472,7 +3498,7 @@
                   </a:rPr>
                   <a:t>	Potentielle Temperatur</a:t>
                 </a:r>
-                <a:endParaRPr lang="de-DE" sz="3600" b="1" dirty="0">
+                <a:endParaRPr lang="de-DE" sz="3200" b="1" dirty="0">
                   <a:solidFill>
                     <a:schemeClr val="tx1"/>
                   </a:solidFill>
@@ -3482,16 +3508,16 @@
               <a:p>
                 <a:pPr algn="just"/>
                 <a:r>
-                  <a:rPr lang="de-DE" sz="3600" b="1" dirty="0">
+                  <a:rPr lang="de-DE" sz="3200" b="1" dirty="0">
                     <a:solidFill>
                       <a:schemeClr val="tx1"/>
                     </a:solidFill>
                     <a:ea typeface="ＭＳ Ｐゴシック" pitchFamily="124" charset="-128"/>
                   </a:rPr>
-                  <a:t>	[d]	</a:t>
+                  <a:t>			[d]	</a:t>
                 </a:r>
                 <a:r>
-                  <a:rPr lang="de-DE" sz="3600" dirty="0">
+                  <a:rPr lang="de-DE" sz="3200" dirty="0">
                     <a:solidFill>
                       <a:schemeClr val="tx1"/>
                     </a:solidFill>
@@ -3499,7 +3525,7 @@
                   </a:rPr>
                   <a:t>Pseudopotentielle Temperatur</a:t>
                 </a:r>
-                <a:endParaRPr lang="de-DE" sz="3600" b="1" dirty="0">
+                <a:endParaRPr lang="de-DE" sz="3200" b="1" dirty="0">
                   <a:solidFill>
                     <a:schemeClr val="tx1"/>
                   </a:solidFill>
@@ -3508,7 +3534,7 @@
               </a:p>
               <a:p>
                 <a:pPr algn="just"/>
-                <a:endParaRPr lang="de-DE" sz="3600" dirty="0">
+                <a:endParaRPr lang="de-DE" sz="3200" dirty="0">
                   <a:solidFill>
                     <a:schemeClr val="tx1"/>
                   </a:solidFill>
@@ -3518,27 +3544,45 @@
               <a:p>
                 <a:pPr algn="just"/>
                 <a:r>
-                  <a:rPr lang="de-DE" sz="3600" dirty="0">
+                  <a:rPr lang="de-DE" sz="3200" dirty="0">
                     <a:solidFill>
                       <a:schemeClr val="tx1"/>
                     </a:solidFill>
                     <a:ea typeface="ＭＳ Ｐゴシック" pitchFamily="124" charset="-128"/>
                   </a:rPr>
-                  <a:t>Zur Bestimmung der Grenzschichthöhe</a:t>
+                  <a:t>Am Übergang der Grenzschicht zur freien Atmosphäre, der sog. „Entrainment </a:t>
+                </a:r>
+                <a:r>
+                  <a:rPr lang="de-DE" sz="3200" dirty="0" err="1">
+                    <a:solidFill>
+                      <a:schemeClr val="tx1"/>
+                    </a:solidFill>
+                    <a:ea typeface="ＭＳ Ｐゴシック" pitchFamily="124" charset="-128"/>
+                  </a:rPr>
+                  <a:t>zone</a:t>
+                </a:r>
+                <a:r>
+                  <a:rPr lang="de-DE" sz="3200" dirty="0">
+                    <a:solidFill>
+                      <a:schemeClr val="tx1"/>
+                    </a:solidFill>
+                    <a:ea typeface="ＭＳ Ｐゴシック" pitchFamily="124" charset="-128"/>
+                  </a:rPr>
+                  <a:t>“ ändern sich diese Größen mit zunehmender Höhe meist abrupt. Um die Grenzschichthöhe </a:t>
                 </a:r>
                 <a14:m>
                   <m:oMath xmlns:m="http://schemas.openxmlformats.org/officeDocument/2006/math">
                     <m:sSub>
                       <m:sSubPr>
                         <m:ctrlPr>
-                          <a:rPr lang="de-DE" sz="3600" i="1">
+                          <a:rPr lang="de-DE" sz="3200" i="1">
                             <a:latin typeface="Cambria Math" panose="02040503050406030204" pitchFamily="18" charset="0"/>
                           </a:rPr>
                         </m:ctrlPr>
                       </m:sSubPr>
                       <m:e>
                         <m:r>
-                          <a:rPr lang="de-DE" sz="3600" i="1">
+                          <a:rPr lang="de-DE" sz="3200" i="1">
                             <a:latin typeface="Cambria Math" panose="02040503050406030204" pitchFamily="18" charset="0"/>
                           </a:rPr>
                           <m:t>𝑧</m:t>
@@ -3546,38 +3590,15 @@
                       </m:e>
                       <m:sub>
                         <m:r>
-                          <a:rPr lang="de-DE" sz="3600" i="1">
+                          <a:rPr lang="de-DE" sz="3200" i="1">
                             <a:latin typeface="Cambria Math" panose="02040503050406030204" pitchFamily="18" charset="0"/>
                           </a:rPr>
                           <m:t>𝐺𝑆</m:t>
                         </m:r>
                       </m:sub>
                     </m:sSub>
-                  </m:oMath>
-                </a14:m>
-                <a:r>
-                  <a:rPr lang="de-DE" sz="3600" dirty="0">
-                    <a:solidFill>
-                      <a:schemeClr val="tx1"/>
-                    </a:solidFill>
-                    <a:ea typeface="ＭＳ Ｐゴシック" pitchFamily="124" charset="-128"/>
-                  </a:rPr>
-                  <a:t>wurde der vertikale Gradient dieser Größen</a:t>
-                </a:r>
-                <a:r>
-                  <a:rPr lang="de-DE" sz="3600" dirty="0"/>
-                  <a:t> </a:t>
-                </a:r>
-                <a14:m>
-                  <m:oMath xmlns:m="http://schemas.openxmlformats.org/officeDocument/2006/math">
                     <m:r>
-                      <a:rPr lang="de-DE" sz="3600" i="1">
-                        <a:latin typeface="Cambria Math" panose="02040503050406030204" pitchFamily="18" charset="0"/>
-                      </a:rPr>
-                      <m:t>𝑥</m:t>
-                    </m:r>
-                    <m:r>
-                      <a:rPr lang="de-DE" sz="3600" i="1">
+                      <a:rPr lang="de-DE" sz="3200" b="0" i="0" smtClean="0">
                         <a:latin typeface="Cambria Math" panose="02040503050406030204" pitchFamily="18" charset="0"/>
                       </a:rPr>
                       <m:t> </m:t>
@@ -3585,13 +3606,32 @@
                   </m:oMath>
                 </a14:m>
                 <a:r>
-                  <a:rPr lang="de-DE" sz="3600" dirty="0">
+                  <a:rPr lang="de-DE" sz="3200" dirty="0">
                     <a:solidFill>
                       <a:schemeClr val="tx1"/>
                     </a:solidFill>
                     <a:ea typeface="ＭＳ Ｐゴシック" pitchFamily="124" charset="-128"/>
                   </a:rPr>
-                  <a:t>berechnet und die Höhe ermittelt, in der Betrag des Gradienten maximal ist:</a:t>
+                  <a:t>zu bestimmen wird deshalb die Höhe ermittelt, in der der Betrag des Vertikalgradienten der jeweiligen Größe </a:t>
+                </a:r>
+                <a14:m>
+                  <m:oMath xmlns:m="http://schemas.openxmlformats.org/officeDocument/2006/math">
+                    <m:r>
+                      <a:rPr lang="de-DE" sz="3200" i="1">
+                        <a:latin typeface="Cambria Math" panose="02040503050406030204" pitchFamily="18" charset="0"/>
+                      </a:rPr>
+                      <m:t>𝑥</m:t>
+                    </m:r>
+                  </m:oMath>
+                </a14:m>
+                <a:r>
+                  <a:rPr lang="de-DE" sz="3200" dirty="0">
+                    <a:solidFill>
+                      <a:schemeClr val="tx1"/>
+                    </a:solidFill>
+                    <a:ea typeface="ＭＳ Ｐゴシック" pitchFamily="124" charset="-128"/>
+                  </a:rPr>
+                  <a:t> maximal ist:</a:t>
                 </a:r>
               </a:p>
               <a:p>
@@ -3601,89 +3641,111 @@
                     <m:sSub>
                       <m:sSubPr>
                         <m:ctrlPr>
-                          <a:rPr lang="de-DE" sz="4400" i="1"/>
+                          <a:rPr lang="de-DE" sz="3200" b="1" i="1">
+                            <a:latin typeface="Cambria Math" panose="02040503050406030204" pitchFamily="18" charset="0"/>
+                          </a:rPr>
                         </m:ctrlPr>
                       </m:sSubPr>
                       <m:e>
                         <m:r>
-                          <a:rPr lang="de-DE" sz="4400" i="1"/>
-                          <m:t>𝑧</m:t>
+                          <a:rPr lang="de-DE" sz="3200" b="1" i="1">
+                            <a:latin typeface="Cambria Math" panose="02040503050406030204" pitchFamily="18" charset="0"/>
+                          </a:rPr>
+                          <m:t>𝒛</m:t>
                         </m:r>
                       </m:e>
                       <m:sub>
                         <m:r>
-                          <a:rPr lang="de-DE" sz="4400" i="1"/>
-                          <m:t>𝐺𝑆</m:t>
+                          <a:rPr lang="de-DE" sz="3200" b="1" i="1">
+                            <a:latin typeface="Cambria Math" panose="02040503050406030204" pitchFamily="18" charset="0"/>
+                          </a:rPr>
+                          <m:t>𝑮𝑺</m:t>
                         </m:r>
                       </m:sub>
                     </m:sSub>
                     <m:r>
-                      <a:rPr lang="de-DE" sz="4400" i="1"/>
+                      <a:rPr lang="de-DE" sz="3200" b="1" i="1">
+                        <a:latin typeface="Cambria Math" panose="02040503050406030204" pitchFamily="18" charset="0"/>
+                      </a:rPr>
                       <m:t>=</m:t>
                     </m:r>
                     <m:r>
-                      <a:rPr lang="de-DE" sz="4400" i="1"/>
-                      <m:t>𝑧</m:t>
+                      <a:rPr lang="de-DE" sz="3200" b="1" i="1">
+                        <a:latin typeface="Cambria Math" panose="02040503050406030204" pitchFamily="18" charset="0"/>
+                      </a:rPr>
+                      <m:t>𝒛</m:t>
                     </m:r>
                     <m:r>
-                      <a:rPr lang="de-DE" sz="4400" i="1"/>
+                      <a:rPr lang="de-DE" sz="3200" b="1" i="1">
+                        <a:latin typeface="Cambria Math" panose="02040503050406030204" pitchFamily="18" charset="0"/>
+                      </a:rPr>
                       <m:t>[ </m:t>
                     </m:r>
                     <m:r>
-                      <m:rPr>
-                        <m:sty m:val="p"/>
-                      </m:rPr>
-                      <a:rPr lang="de-DE" sz="4400"/>
-                      <m:t>max</m:t>
+                      <a:rPr lang="de-DE" sz="3200" b="1" i="1">
+                        <a:latin typeface="Cambria Math" panose="02040503050406030204" pitchFamily="18" charset="0"/>
+                      </a:rPr>
+                      <m:t>𝒎𝒂𝒙</m:t>
                     </m:r>
                     <m:r>
-                      <a:rPr lang="de-DE" sz="4400" i="1"/>
+                      <a:rPr lang="de-DE" sz="3200" b="1" i="1">
+                        <a:latin typeface="Cambria Math" panose="02040503050406030204" pitchFamily="18" charset="0"/>
+                      </a:rPr>
                       <m:t>( </m:t>
                     </m:r>
                     <m:sSub>
                       <m:sSubPr>
                         <m:ctrlPr>
-                          <a:rPr lang="de-DE" sz="4400" i="1"/>
+                          <a:rPr lang="de-DE" sz="3200" b="1" i="1">
+                            <a:latin typeface="Cambria Math" panose="02040503050406030204" pitchFamily="18" charset="0"/>
+                          </a:rPr>
                         </m:ctrlPr>
                       </m:sSubPr>
                       <m:e>
                         <m:r>
-                          <m:rPr>
-                            <m:sty m:val="p"/>
-                          </m:rPr>
-                          <a:rPr lang="de-DE" sz="4400"/>
-                          <m:t>grad</m:t>
+                          <a:rPr lang="de-DE" sz="3200" b="1" i="1">
+                            <a:latin typeface="Cambria Math" panose="02040503050406030204" pitchFamily="18" charset="0"/>
+                          </a:rPr>
+                          <m:t>𝒈𝒓𝒂𝒅</m:t>
                         </m:r>
                       </m:e>
                       <m:sub>
                         <m:r>
-                          <a:rPr lang="de-DE" sz="4400" i="1"/>
-                          <m:t>𝑧</m:t>
+                          <a:rPr lang="de-DE" sz="3200" b="1" i="1">
+                            <a:latin typeface="Cambria Math" panose="02040503050406030204" pitchFamily="18" charset="0"/>
+                          </a:rPr>
+                          <m:t>𝒛</m:t>
                         </m:r>
                       </m:sub>
                     </m:sSub>
                     <m:r>
-                      <a:rPr lang="de-DE" sz="4400" i="1"/>
+                      <a:rPr lang="de-DE" sz="3200" b="1" i="1">
+                        <a:latin typeface="Cambria Math" panose="02040503050406030204" pitchFamily="18" charset="0"/>
+                      </a:rPr>
                       <m:t>(</m:t>
                     </m:r>
                     <m:r>
-                      <a:rPr lang="de-DE" sz="4400" i="1"/>
-                      <m:t>𝑥</m:t>
+                      <a:rPr lang="de-DE" sz="3200" b="1" i="1">
+                        <a:latin typeface="Cambria Math" panose="02040503050406030204" pitchFamily="18" charset="0"/>
+                      </a:rPr>
+                      <m:t>𝒙</m:t>
                     </m:r>
                     <m:r>
-                      <a:rPr lang="de-DE" sz="4400" i="1"/>
+                      <a:rPr lang="de-DE" sz="3200" b="1" i="1">
+                        <a:latin typeface="Cambria Math" panose="02040503050406030204" pitchFamily="18" charset="0"/>
+                      </a:rPr>
                       <m:t>) ) </m:t>
                     </m:r>
                   </m:oMath>
                 </a14:m>
                 <a:r>
-                  <a:rPr lang="de-DE" sz="4400" dirty="0"/>
+                  <a:rPr lang="de-DE" sz="3200" b="1" dirty="0"/>
                   <a:t>]</a:t>
                 </a:r>
               </a:p>
               <a:p>
                 <a:pPr algn="just"/>
-                <a:endParaRPr lang="de-DE" sz="3600" dirty="0">
+                <a:endParaRPr lang="de-DE" sz="3200" dirty="0">
                   <a:solidFill>
                     <a:schemeClr val="tx1"/>
                   </a:solidFill>
@@ -3693,17 +3755,54 @@
               <a:p>
                 <a:pPr algn="just"/>
                 <a:r>
-                  <a:rPr lang="de-DE" sz="3600" dirty="0">
+                  <a:rPr lang="de-DE" sz="3200" dirty="0">
                     <a:solidFill>
                       <a:schemeClr val="tx1"/>
                     </a:solidFill>
                     <a:ea typeface="ＭＳ Ｐゴシック" pitchFamily="124" charset="-128"/>
                   </a:rPr>
-                  <a:t>Innerhalb der Grenzschicht ist die Atmosphäre aufgrund von Turbulenz gut durchmischt, sodass vertikale Gradienten der Feuchte und potentiellen Temperatur dort klein sind. Da kaum Durchmischung zwischen Grenzschicht und der darüberliegenden freien Atmosphäre stattfindet, unterscheiden sich Feuchte und potentielle Temperatur der beiden Schichten meist stark. Am Übergang sind deshalb große Gradienten zu erwarten.</a:t>
+                  <a:t>Abbildung 2 zeigt die mit der beschriebenen Methode bestimmten Grenzschichthöhen, sowie die des </a:t>
+                </a:r>
+                <a:r>
+                  <a:rPr lang="de-DE" sz="3200" dirty="0" err="1">
+                    <a:solidFill>
+                      <a:schemeClr val="tx1"/>
+                    </a:solidFill>
+                    <a:ea typeface="ＭＳ Ｐゴシック" pitchFamily="124" charset="-128"/>
+                  </a:rPr>
+                  <a:t>Ceilometers</a:t>
+                </a:r>
+                <a:r>
+                  <a:rPr lang="de-DE" sz="3200" dirty="0">
+                    <a:solidFill>
+                      <a:schemeClr val="tx1"/>
+                    </a:solidFill>
+                    <a:ea typeface="ＭＳ Ｐゴシック" pitchFamily="124" charset="-128"/>
+                  </a:rPr>
+                  <a:t> für zwei verschiedene </a:t>
+                </a:r>
+                <a:r>
+                  <a:rPr lang="de-DE" sz="3200" dirty="0" err="1">
+                    <a:solidFill>
+                      <a:schemeClr val="tx1"/>
+                    </a:solidFill>
+                    <a:ea typeface="ＭＳ Ｐゴシック" pitchFamily="124" charset="-128"/>
+                  </a:rPr>
+                  <a:t>Messtage</a:t>
+                </a:r>
+                <a:r>
+                  <a:rPr lang="de-DE" sz="3200" dirty="0">
+                    <a:solidFill>
+                      <a:schemeClr val="tx1"/>
+                    </a:solidFill>
+                    <a:ea typeface="ＭＳ Ｐゴシック" pitchFamily="124" charset="-128"/>
+                  </a:rPr>
+                  <a:t>.</a:t>
                 </a:r>
               </a:p>
               <a:p>
-                <a:endParaRPr lang="de-DE" sz="3600" dirty="0">
+                <a:pPr algn="just"/>
+                <a:endParaRPr lang="de-DE" sz="3200" dirty="0">
                   <a:solidFill>
                     <a:schemeClr val="tx1"/>
                   </a:solidFill>
@@ -3711,7 +3810,17 @@
                 </a:endParaRPr>
               </a:p>
               <a:p>
-                <a:endParaRPr lang="de-DE" sz="3600" dirty="0">
+                <a:pPr algn="just"/>
+                <a:endParaRPr lang="de-DE" sz="3200" dirty="0">
+                  <a:solidFill>
+                    <a:schemeClr val="tx1"/>
+                  </a:solidFill>
+                  <a:ea typeface="ＭＳ Ｐゴシック" pitchFamily="124" charset="-128"/>
+                </a:endParaRPr>
+              </a:p>
+              <a:p>
+                <a:pPr algn="just"/>
+                <a:endParaRPr lang="de-DE" sz="3400" dirty="0">
                   <a:solidFill>
                     <a:schemeClr val="tx1"/>
                   </a:solidFill>
@@ -3738,8 +3847,8 @@
             </p:nvSpPr>
             <p:spPr>
               <a:xfrm>
-                <a:off x="1456085" y="12403767"/>
-                <a:ext cx="14329593" cy="12649617"/>
+                <a:off x="1130049" y="12902599"/>
+                <a:ext cx="16383821" cy="9602629"/>
               </a:xfrm>
               <a:prstGeom prst="rect">
                 <a:avLst/>
@@ -3747,7 +3856,7 @@
               <a:blipFill>
                 <a:blip r:embed="rId12"/>
                 <a:stretch>
-                  <a:fillRect l="-1744" t="-1060" r="-1276"/>
+                  <a:fillRect l="-1302" t="-1143" r="-967"/>
                 </a:stretch>
               </a:blipFill>
             </p:spPr>
@@ -3780,21 +3889,21 @@
         </p:nvSpPr>
         <p:spPr>
           <a:xfrm>
-            <a:off x="12387757" y="25506586"/>
-            <a:ext cx="15135225" cy="769441"/>
+            <a:off x="12257286" y="23994169"/>
+            <a:ext cx="16633848" cy="6186309"/>
           </a:xfrm>
           <a:prstGeom prst="rect">
             <a:avLst/>
           </a:prstGeom>
         </p:spPr>
         <p:txBody>
-          <a:bodyPr>
+          <a:bodyPr wrap="square">
             <a:spAutoFit/>
           </a:bodyPr>
           <a:lstStyle/>
           <a:p>
             <a:r>
-              <a:rPr lang="de-DE" sz="4400" b="1" dirty="0">
+              <a:rPr lang="de-DE" sz="4000" b="1" dirty="0">
                 <a:solidFill>
                   <a:srgbClr val="CB1028"/>
                 </a:solidFill>
@@ -3802,6 +3911,123 @@
               </a:rPr>
               <a:t>Ergebnisse</a:t>
             </a:r>
+          </a:p>
+          <a:p>
+            <a:pPr marL="457200" indent="-457200" algn="just">
+              <a:buFont typeface="Arial" panose="020B0604020202020204" pitchFamily="34" charset="0"/>
+              <a:buChar char="•"/>
+            </a:pPr>
+            <a:r>
+              <a:rPr lang="de-DE" sz="3200" dirty="0">
+                <a:solidFill>
+                  <a:schemeClr val="tx1"/>
+                </a:solidFill>
+                <a:ea typeface="ＭＳ Ｐゴシック" pitchFamily="124" charset="-128"/>
+              </a:rPr>
+              <a:t>Die aus den Gradienten der Größen a-d abgeleiteten Grenzschichthöhen sind bis auf Abweichungen von einigen Metern untereinander konsistent. </a:t>
+            </a:r>
+          </a:p>
+          <a:p>
+            <a:pPr algn="just"/>
+            <a:endParaRPr lang="de-DE" sz="3200" dirty="0">
+              <a:solidFill>
+                <a:schemeClr val="tx1"/>
+              </a:solidFill>
+              <a:ea typeface="ＭＳ Ｐゴシック" pitchFamily="124" charset="-128"/>
+            </a:endParaRPr>
+          </a:p>
+          <a:p>
+            <a:pPr marL="457200" indent="-457200" algn="just">
+              <a:buFont typeface="Arial" panose="020B0604020202020204" pitchFamily="34" charset="0"/>
+              <a:buChar char="•"/>
+            </a:pPr>
+            <a:r>
+              <a:rPr lang="de-DE" sz="3200" dirty="0">
+                <a:solidFill>
+                  <a:schemeClr val="tx1"/>
+                </a:solidFill>
+                <a:ea typeface="ＭＳ Ｐゴシック" pitchFamily="124" charset="-128"/>
+              </a:rPr>
+              <a:t>An Tag 1 stimmen sie über lange Zeiträume gut mit der Grenzschichthöhe des </a:t>
+            </a:r>
+            <a:r>
+              <a:rPr lang="de-DE" sz="3200" dirty="0" err="1">
+                <a:solidFill>
+                  <a:schemeClr val="tx1"/>
+                </a:solidFill>
+                <a:ea typeface="ＭＳ Ｐゴシック" pitchFamily="124" charset="-128"/>
+              </a:rPr>
+              <a:t>Ceilometers</a:t>
+            </a:r>
+            <a:r>
+              <a:rPr lang="de-DE" sz="3200" dirty="0">
+                <a:solidFill>
+                  <a:schemeClr val="tx1"/>
+                </a:solidFill>
+                <a:ea typeface="ＭＳ Ｐゴシック" pitchFamily="124" charset="-128"/>
+              </a:rPr>
+              <a:t> überein, an Tag 2 liegt die Grenzschichthöhe des </a:t>
+            </a:r>
+            <a:r>
+              <a:rPr lang="de-DE" sz="3200" dirty="0" err="1">
+                <a:solidFill>
+                  <a:schemeClr val="tx1"/>
+                </a:solidFill>
+                <a:ea typeface="ＭＳ Ｐゴシック" pitchFamily="124" charset="-128"/>
+              </a:rPr>
+              <a:t>Ceilometers</a:t>
+            </a:r>
+            <a:r>
+              <a:rPr lang="de-DE" sz="3200" dirty="0">
+                <a:solidFill>
+                  <a:schemeClr val="tx1"/>
+                </a:solidFill>
+                <a:ea typeface="ＭＳ Ｐゴシック" pitchFamily="124" charset="-128"/>
+              </a:rPr>
+              <a:t> meist deutlich oberhalb. Mit dem </a:t>
+            </a:r>
+            <a:r>
+              <a:rPr lang="de-DE" sz="3200" dirty="0" err="1">
+                <a:solidFill>
+                  <a:schemeClr val="tx1"/>
+                </a:solidFill>
+                <a:ea typeface="ＭＳ Ｐゴシック" pitchFamily="124" charset="-128"/>
+              </a:rPr>
+              <a:t>Ceilometer</a:t>
+            </a:r>
+            <a:r>
+              <a:rPr lang="de-DE" sz="3200" dirty="0">
+                <a:solidFill>
+                  <a:schemeClr val="tx1"/>
+                </a:solidFill>
+                <a:ea typeface="ＭＳ Ｐゴシック" pitchFamily="124" charset="-128"/>
+              </a:rPr>
+              <a:t> wird die Grenzschichthöhe aus der vertikalen Aerosolverteilung abgeleitet. Die Oberkante der Schicht mit hoher Aerosolkonzentration muss allerdings nicht den Höhen entsprechen, die aus den Größen a-d abgeleitet werden. </a:t>
+            </a:r>
+          </a:p>
+          <a:p>
+            <a:pPr marL="457200" indent="-457200">
+              <a:buFont typeface="Arial" panose="020B0604020202020204" pitchFamily="34" charset="0"/>
+              <a:buChar char="•"/>
+            </a:pPr>
+            <a:endParaRPr lang="de-DE" sz="3400" dirty="0">
+              <a:solidFill>
+                <a:schemeClr val="tx1"/>
+              </a:solidFill>
+              <a:ea typeface="ＭＳ Ｐゴシック" pitchFamily="124" charset="-128"/>
+            </a:endParaRPr>
+          </a:p>
+          <a:p>
+            <a:pPr marL="457200" indent="-457200">
+              <a:buFont typeface="Arial" panose="020B0604020202020204" pitchFamily="34" charset="0"/>
+              <a:buChar char="•"/>
+            </a:pPr>
+            <a:endParaRPr lang="de-DE" sz="3400" dirty="0">
+              <a:solidFill>
+                <a:schemeClr val="tx1"/>
+              </a:solidFill>
+              <a:ea typeface="ＭＳ Ｐゴシック" pitchFamily="124" charset="-128"/>
+            </a:endParaRPr>
           </a:p>
         </p:txBody>
       </p:sp>
@@ -3819,8 +4045,8 @@
         </p:nvSpPr>
         <p:spPr bwMode="auto">
           <a:xfrm>
-            <a:off x="1130049" y="33047818"/>
-            <a:ext cx="27465219" cy="2013454"/>
+            <a:off x="880022" y="33047818"/>
+            <a:ext cx="28587175" cy="2013454"/>
           </a:xfrm>
           <a:prstGeom prst="rect">
             <a:avLst/>
@@ -3879,6 +4105,33 @@
               <a:t>Fazit</a:t>
             </a:r>
           </a:p>
+          <a:p>
+            <a:pPr marL="0" marR="0" indent="0" algn="l" defTabSz="914400" rtl="0" eaLnBrk="0" fontAlgn="base" latinLnBrk="0" hangingPunct="0">
+              <a:lnSpc>
+                <a:spcPct val="100000"/>
+              </a:lnSpc>
+              <a:spcBef>
+                <a:spcPct val="0"/>
+              </a:spcBef>
+              <a:spcAft>
+                <a:spcPct val="0"/>
+              </a:spcAft>
+              <a:buClrTx/>
+              <a:buSzTx/>
+              <a:buFontTx/>
+              <a:buNone/>
+              <a:tabLst/>
+            </a:pPr>
+            <a:r>
+              <a:rPr lang="de-DE" sz="3600" b="1" i="1" dirty="0">
+                <a:solidFill>
+                  <a:schemeClr val="tx1"/>
+                </a:solidFill>
+                <a:ea typeface="ＭＳ Ｐゴシック" pitchFamily="124" charset="-128"/>
+              </a:rPr>
+              <a:t>Die mit den ALPACAs gemessenen Vertikalprofile von Temperatur, relativer Feuchte und Druck können genutzt werden, um die Höhe der Grenzschicht abzuschätzen. </a:t>
+            </a:r>
+          </a:p>
         </p:txBody>
       </p:sp>
       <p:sp>
@@ -3895,7 +4148,7 @@
         </p:nvSpPr>
         <p:spPr>
           <a:xfrm>
-            <a:off x="26586878" y="7648353"/>
+            <a:off x="26802902" y="7447330"/>
             <a:ext cx="1080120" cy="1015663"/>
           </a:xfrm>
           <a:prstGeom prst="rect">
@@ -3934,7 +4187,7 @@
         </p:nvSpPr>
         <p:spPr>
           <a:xfrm>
-            <a:off x="26586878" y="11536785"/>
+            <a:off x="26802902" y="10672689"/>
             <a:ext cx="1080120" cy="1015663"/>
           </a:xfrm>
           <a:prstGeom prst="rect">
@@ -3973,7 +4226,7 @@
         </p:nvSpPr>
         <p:spPr>
           <a:xfrm>
-            <a:off x="26586878" y="15569233"/>
+            <a:off x="26802902" y="13985057"/>
             <a:ext cx="1080120" cy="1015663"/>
           </a:xfrm>
           <a:prstGeom prst="rect">
@@ -4012,7 +4265,7 @@
         </p:nvSpPr>
         <p:spPr>
           <a:xfrm>
-            <a:off x="26586878" y="19666138"/>
+            <a:off x="26802902" y="17441441"/>
             <a:ext cx="1080120" cy="1015663"/>
           </a:xfrm>
           <a:prstGeom prst="rect">
@@ -4034,6 +4287,503 @@
               </a:rPr>
               <a:t>[d]</a:t>
             </a:r>
+          </a:p>
+        </p:txBody>
+      </p:sp>
+      <p:pic>
+        <p:nvPicPr>
+          <p:cNvPr id="15" name="Grafik 14">
+            <a:extLst>
+              <a:ext uri="{FF2B5EF4-FFF2-40B4-BE49-F238E27FC236}">
+                <a16:creationId xmlns:a16="http://schemas.microsoft.com/office/drawing/2014/main" id="{1B484F96-BDD7-4ED4-967A-B90E878F9B14}"/>
+              </a:ext>
+            </a:extLst>
+          </p:cNvPr>
+          <p:cNvPicPr>
+            <a:picLocks noChangeAspect="1"/>
+          </p:cNvPicPr>
+          <p:nvPr/>
+        </p:nvPicPr>
+        <p:blipFill>
+          <a:blip r:embed="rId13" cstate="email">
+            <a:extLst>
+              <a:ext uri="{28A0092B-C50C-407E-A947-70E740481C1C}">
+                <a14:useLocalDpi xmlns:a14="http://schemas.microsoft.com/office/drawing/2010/main" val="0"/>
+              </a:ext>
+            </a:extLst>
+          </a:blip>
+          <a:stretch>
+            <a:fillRect/>
+          </a:stretch>
+        </p:blipFill>
+        <p:spPr>
+          <a:xfrm>
+            <a:off x="5992590" y="26859328"/>
+            <a:ext cx="3639678" cy="1830523"/>
+          </a:xfrm>
+          <a:prstGeom prst="rect">
+            <a:avLst/>
+          </a:prstGeom>
+        </p:spPr>
+      </p:pic>
+      <p:pic>
+        <p:nvPicPr>
+          <p:cNvPr id="48" name="Grafik 47">
+            <a:extLst>
+              <a:ext uri="{FF2B5EF4-FFF2-40B4-BE49-F238E27FC236}">
+                <a16:creationId xmlns:a16="http://schemas.microsoft.com/office/drawing/2014/main" id="{BB1C5633-6B63-46F0-88FA-CD7E3FD81E07}"/>
+              </a:ext>
+            </a:extLst>
+          </p:cNvPr>
+          <p:cNvPicPr>
+            <a:picLocks noChangeAspect="1"/>
+          </p:cNvPicPr>
+          <p:nvPr/>
+        </p:nvPicPr>
+        <p:blipFill rotWithShape="1">
+          <a:blip r:embed="rId14" cstate="email">
+            <a:extLst>
+              <a:ext uri="{28A0092B-C50C-407E-A947-70E740481C1C}">
+                <a14:useLocalDpi xmlns:a14="http://schemas.microsoft.com/office/drawing/2010/main" val="0"/>
+              </a:ext>
+            </a:extLst>
+          </a:blip>
+          <a:srcRect t="18801" b="48996"/>
+          <a:stretch/>
+        </p:blipFill>
+        <p:spPr>
+          <a:xfrm>
+            <a:off x="18903680" y="20537785"/>
+            <a:ext cx="9339382" cy="990000"/>
+          </a:xfrm>
+          <a:prstGeom prst="rect">
+            <a:avLst/>
+          </a:prstGeom>
+        </p:spPr>
+      </p:pic>
+      <p:pic>
+        <p:nvPicPr>
+          <p:cNvPr id="50" name="Grafik 49">
+            <a:extLst>
+              <a:ext uri="{FF2B5EF4-FFF2-40B4-BE49-F238E27FC236}">
+                <a16:creationId xmlns:a16="http://schemas.microsoft.com/office/drawing/2014/main" id="{1AFDD656-12D4-4B34-850A-09B0D59EB4C9}"/>
+              </a:ext>
+            </a:extLst>
+          </p:cNvPr>
+          <p:cNvPicPr>
+            <a:picLocks noChangeAspect="1"/>
+          </p:cNvPicPr>
+          <p:nvPr/>
+        </p:nvPicPr>
+        <p:blipFill>
+          <a:blip r:embed="rId15" cstate="email">
+            <a:extLst>
+              <a:ext uri="{28A0092B-C50C-407E-A947-70E740481C1C}">
+                <a14:useLocalDpi xmlns:a14="http://schemas.microsoft.com/office/drawing/2010/main" val="0"/>
+              </a:ext>
+            </a:extLst>
+          </a:blip>
+          <a:stretch>
+            <a:fillRect/>
+          </a:stretch>
+        </p:blipFill>
+        <p:spPr>
+          <a:xfrm>
+            <a:off x="736006" y="21353434"/>
+            <a:ext cx="11222783" cy="4500000"/>
+          </a:xfrm>
+          <a:prstGeom prst="rect">
+            <a:avLst/>
+          </a:prstGeom>
+        </p:spPr>
+      </p:pic>
+      <p:sp>
+        <p:nvSpPr>
+          <p:cNvPr id="51" name="Rechteck 50">
+            <a:extLst>
+              <a:ext uri="{FF2B5EF4-FFF2-40B4-BE49-F238E27FC236}">
+                <a16:creationId xmlns:a16="http://schemas.microsoft.com/office/drawing/2014/main" id="{68CFEE92-01D5-463D-9A02-CF06A165DEB3}"/>
+              </a:ext>
+            </a:extLst>
+          </p:cNvPr>
+          <p:cNvSpPr/>
+          <p:nvPr/>
+        </p:nvSpPr>
+        <p:spPr bwMode="auto">
+          <a:xfrm>
+            <a:off x="880022" y="7211363"/>
+            <a:ext cx="16890853" cy="5333534"/>
+          </a:xfrm>
+          <a:prstGeom prst="rect">
+            <a:avLst/>
+          </a:prstGeom>
+          <a:noFill/>
+          <a:ln w="76200" cap="flat" cmpd="sng" algn="ctr">
+            <a:solidFill>
+              <a:srgbClr val="CB1028"/>
+            </a:solidFill>
+            <a:prstDash val="solid"/>
+            <a:round/>
+            <a:headEnd type="none" w="med" len="med"/>
+            <a:tailEnd type="none" w="med" len="med"/>
+          </a:ln>
+          <a:effectLst/>
+          <a:extLst>
+            <a:ext uri="{909E8E84-426E-40DD-AFC4-6F175D3DCCD1}">
+              <a14:hiddenFill xmlns:a14="http://schemas.microsoft.com/office/drawing/2010/main">
+                <a:solidFill>
+                  <a:schemeClr val="accent1"/>
+                </a:solidFill>
+              </a14:hiddenFill>
+            </a:ext>
+            <a:ext uri="{AF507438-7753-43E0-B8FC-AC1667EBCBE1}">
+              <a14:hiddenEffects xmlns:a14="http://schemas.microsoft.com/office/drawing/2010/main">
+                <a:effectLst>
+                  <a:outerShdw dist="35921" dir="2700000" algn="ctr" rotWithShape="0">
+                    <a:schemeClr val="bg2"/>
+                  </a:outerShdw>
+                </a:effectLst>
+              </a14:hiddenEffects>
+            </a:ext>
+          </a:extLst>
+        </p:spPr>
+        <p:txBody>
+          <a:bodyPr vert="horz" wrap="square" lIns="90000" tIns="46800" rIns="90000" bIns="46800" numCol="1" rtlCol="0" anchor="t" anchorCtr="0" compatLnSpc="1">
+            <a:prstTxWarp prst="textNoShape">
+              <a:avLst/>
+            </a:prstTxWarp>
+          </a:bodyPr>
+          <a:lstStyle/>
+          <a:p>
+            <a:pPr marL="0" marR="0" indent="0" algn="l" defTabSz="914400" rtl="0" eaLnBrk="0" fontAlgn="base" latinLnBrk="0" hangingPunct="0">
+              <a:lnSpc>
+                <a:spcPct val="100000"/>
+              </a:lnSpc>
+              <a:spcBef>
+                <a:spcPct val="0"/>
+              </a:spcBef>
+              <a:spcAft>
+                <a:spcPct val="0"/>
+              </a:spcAft>
+              <a:buClrTx/>
+              <a:buSzTx/>
+              <a:buFontTx/>
+              <a:buNone/>
+              <a:tabLst/>
+            </a:pPr>
+            <a:endParaRPr kumimoji="0" lang="de-DE" sz="2400" b="0" i="0" u="none" strike="noStrike" cap="none" normalizeH="0" baseline="0">
+              <a:ln>
+                <a:noFill/>
+              </a:ln>
+              <a:solidFill>
+                <a:srgbClr val="000000"/>
+              </a:solidFill>
+              <a:effectLst/>
+              <a:latin typeface="Arial" charset="0"/>
+              <a:ea typeface="ＭＳ Ｐゴシック" pitchFamily="124" charset="-128"/>
+            </a:endParaRPr>
+          </a:p>
+        </p:txBody>
+      </p:sp>
+      <p:sp>
+        <p:nvSpPr>
+          <p:cNvPr id="52" name="Rechteck 51">
+            <a:extLst>
+              <a:ext uri="{FF2B5EF4-FFF2-40B4-BE49-F238E27FC236}">
+                <a16:creationId xmlns:a16="http://schemas.microsoft.com/office/drawing/2014/main" id="{F3575320-5DCA-4F4E-8747-AF1EDBFBCCDE}"/>
+              </a:ext>
+            </a:extLst>
+          </p:cNvPr>
+          <p:cNvSpPr/>
+          <p:nvPr/>
+        </p:nvSpPr>
+        <p:spPr bwMode="auto">
+          <a:xfrm>
+            <a:off x="880022" y="12860622"/>
+            <a:ext cx="16890853" cy="8288811"/>
+          </a:xfrm>
+          <a:prstGeom prst="rect">
+            <a:avLst/>
+          </a:prstGeom>
+          <a:noFill/>
+          <a:ln w="76200" cap="flat" cmpd="sng" algn="ctr">
+            <a:solidFill>
+              <a:srgbClr val="CB1028"/>
+            </a:solidFill>
+            <a:prstDash val="solid"/>
+            <a:round/>
+            <a:headEnd type="none" w="med" len="med"/>
+            <a:tailEnd type="none" w="med" len="med"/>
+          </a:ln>
+          <a:effectLst/>
+          <a:extLst>
+            <a:ext uri="{909E8E84-426E-40DD-AFC4-6F175D3DCCD1}">
+              <a14:hiddenFill xmlns:a14="http://schemas.microsoft.com/office/drawing/2010/main">
+                <a:solidFill>
+                  <a:schemeClr val="accent1"/>
+                </a:solidFill>
+              </a14:hiddenFill>
+            </a:ext>
+            <a:ext uri="{AF507438-7753-43E0-B8FC-AC1667EBCBE1}">
+              <a14:hiddenEffects xmlns:a14="http://schemas.microsoft.com/office/drawing/2010/main">
+                <a:effectLst>
+                  <a:outerShdw dist="35921" dir="2700000" algn="ctr" rotWithShape="0">
+                    <a:schemeClr val="bg2"/>
+                  </a:outerShdw>
+                </a:effectLst>
+              </a14:hiddenEffects>
+            </a:ext>
+          </a:extLst>
+        </p:spPr>
+        <p:txBody>
+          <a:bodyPr vert="horz" wrap="square" lIns="90000" tIns="46800" rIns="90000" bIns="46800" numCol="1" rtlCol="0" anchor="t" anchorCtr="0" compatLnSpc="1">
+            <a:prstTxWarp prst="textNoShape">
+              <a:avLst/>
+            </a:prstTxWarp>
+          </a:bodyPr>
+          <a:lstStyle/>
+          <a:p>
+            <a:pPr marL="0" marR="0" indent="0" algn="l" defTabSz="914400" rtl="0" eaLnBrk="0" fontAlgn="base" latinLnBrk="0" hangingPunct="0">
+              <a:lnSpc>
+                <a:spcPct val="100000"/>
+              </a:lnSpc>
+              <a:spcBef>
+                <a:spcPct val="0"/>
+              </a:spcBef>
+              <a:spcAft>
+                <a:spcPct val="0"/>
+              </a:spcAft>
+              <a:buClrTx/>
+              <a:buSzTx/>
+              <a:buFontTx/>
+              <a:buNone/>
+              <a:tabLst/>
+            </a:pPr>
+            <a:endParaRPr kumimoji="0" lang="de-DE" sz="2400" b="0" i="0" u="none" strike="noStrike" cap="none" normalizeH="0" baseline="0">
+              <a:ln>
+                <a:noFill/>
+              </a:ln>
+              <a:solidFill>
+                <a:srgbClr val="000000"/>
+              </a:solidFill>
+              <a:effectLst/>
+              <a:latin typeface="Arial" charset="0"/>
+              <a:ea typeface="ＭＳ Ｐゴシック" pitchFamily="124" charset="-128"/>
+            </a:endParaRPr>
+          </a:p>
+        </p:txBody>
+      </p:sp>
+      <p:sp>
+        <p:nvSpPr>
+          <p:cNvPr id="53" name="Rechteck 52">
+            <a:extLst>
+              <a:ext uri="{FF2B5EF4-FFF2-40B4-BE49-F238E27FC236}">
+                <a16:creationId xmlns:a16="http://schemas.microsoft.com/office/drawing/2014/main" id="{7973F3FC-5E7F-4F70-BBE8-C9FD865385DA}"/>
+              </a:ext>
+            </a:extLst>
+          </p:cNvPr>
+          <p:cNvSpPr/>
+          <p:nvPr/>
+        </p:nvSpPr>
+        <p:spPr bwMode="auto">
+          <a:xfrm>
+            <a:off x="12113270" y="23887221"/>
+            <a:ext cx="17353928" cy="7827555"/>
+          </a:xfrm>
+          <a:prstGeom prst="rect">
+            <a:avLst/>
+          </a:prstGeom>
+          <a:noFill/>
+          <a:ln w="76200" cap="flat" cmpd="sng" algn="ctr">
+            <a:solidFill>
+              <a:srgbClr val="CB1028"/>
+            </a:solidFill>
+            <a:prstDash val="solid"/>
+            <a:round/>
+            <a:headEnd type="none" w="med" len="med"/>
+            <a:tailEnd type="none" w="med" len="med"/>
+          </a:ln>
+          <a:effectLst/>
+          <a:extLst>
+            <a:ext uri="{909E8E84-426E-40DD-AFC4-6F175D3DCCD1}">
+              <a14:hiddenFill xmlns:a14="http://schemas.microsoft.com/office/drawing/2010/main">
+                <a:solidFill>
+                  <a:schemeClr val="accent1"/>
+                </a:solidFill>
+              </a14:hiddenFill>
+            </a:ext>
+            <a:ext uri="{AF507438-7753-43E0-B8FC-AC1667EBCBE1}">
+              <a14:hiddenEffects xmlns:a14="http://schemas.microsoft.com/office/drawing/2010/main">
+                <a:effectLst>
+                  <a:outerShdw dist="35921" dir="2700000" algn="ctr" rotWithShape="0">
+                    <a:schemeClr val="bg2"/>
+                  </a:outerShdw>
+                </a:effectLst>
+              </a14:hiddenEffects>
+            </a:ext>
+          </a:extLst>
+        </p:spPr>
+        <p:txBody>
+          <a:bodyPr vert="horz" wrap="square" lIns="90000" tIns="46800" rIns="90000" bIns="46800" numCol="1" rtlCol="0" anchor="t" anchorCtr="0" compatLnSpc="1">
+            <a:prstTxWarp prst="textNoShape">
+              <a:avLst/>
+            </a:prstTxWarp>
+          </a:bodyPr>
+          <a:lstStyle/>
+          <a:p>
+            <a:pPr marL="0" marR="0" indent="0" algn="l" defTabSz="914400" rtl="0" eaLnBrk="0" fontAlgn="base" latinLnBrk="0" hangingPunct="0">
+              <a:lnSpc>
+                <a:spcPct val="100000"/>
+              </a:lnSpc>
+              <a:spcBef>
+                <a:spcPct val="0"/>
+              </a:spcBef>
+              <a:spcAft>
+                <a:spcPct val="0"/>
+              </a:spcAft>
+              <a:buClrTx/>
+              <a:buSzTx/>
+              <a:buFontTx/>
+              <a:buNone/>
+              <a:tabLst/>
+            </a:pPr>
+            <a:endParaRPr kumimoji="0" lang="de-DE" sz="2400" b="0" i="0" u="none" strike="noStrike" cap="none" normalizeH="0" baseline="0">
+              <a:ln>
+                <a:noFill/>
+              </a:ln>
+              <a:solidFill>
+                <a:srgbClr val="000000"/>
+              </a:solidFill>
+              <a:effectLst/>
+              <a:latin typeface="Arial" charset="0"/>
+              <a:ea typeface="ＭＳ Ｐゴシック" pitchFamily="124" charset="-128"/>
+            </a:endParaRPr>
+          </a:p>
+        </p:txBody>
+      </p:sp>
+      <p:pic>
+        <p:nvPicPr>
+          <p:cNvPr id="54" name="Bild 15">
+            <a:extLst>
+              <a:ext uri="{FF2B5EF4-FFF2-40B4-BE49-F238E27FC236}">
+                <a16:creationId xmlns:a16="http://schemas.microsoft.com/office/drawing/2014/main" id="{7AF6A7C0-DE86-40DA-BFAB-3795CA0D307B}"/>
+              </a:ext>
+            </a:extLst>
+          </p:cNvPr>
+          <p:cNvPicPr>
+            <a:picLocks noChangeAspect="1"/>
+          </p:cNvPicPr>
+          <p:nvPr/>
+        </p:nvPicPr>
+        <p:blipFill>
+          <a:blip r:embed="rId16" cstate="email">
+            <a:extLst>
+              <a:ext uri="{28A0092B-C50C-407E-A947-70E740481C1C}">
+                <a14:useLocalDpi xmlns:a14="http://schemas.microsoft.com/office/drawing/2010/main" val="0"/>
+              </a:ext>
+            </a:extLst>
+          </a:blip>
+          <a:stretch>
+            <a:fillRect/>
+          </a:stretch>
+        </p:blipFill>
+        <p:spPr>
+          <a:xfrm>
+            <a:off x="12905358" y="37898337"/>
+            <a:ext cx="6997768" cy="4673896"/>
+          </a:xfrm>
+          <a:prstGeom prst="rect">
+            <a:avLst/>
+          </a:prstGeom>
+        </p:spPr>
+      </p:pic>
+      <p:sp>
+        <p:nvSpPr>
+          <p:cNvPr id="55" name="Textfeld 54">
+            <a:extLst>
+              <a:ext uri="{FF2B5EF4-FFF2-40B4-BE49-F238E27FC236}">
+                <a16:creationId xmlns:a16="http://schemas.microsoft.com/office/drawing/2014/main" id="{C0B73B63-FE2C-4364-AE63-291F7E9BEC75}"/>
+              </a:ext>
+            </a:extLst>
+          </p:cNvPr>
+          <p:cNvSpPr txBox="1"/>
+          <p:nvPr/>
+        </p:nvSpPr>
+        <p:spPr>
+          <a:xfrm>
+            <a:off x="18161942" y="21459368"/>
+            <a:ext cx="11257443" cy="2246769"/>
+          </a:xfrm>
+          <a:prstGeom prst="rect">
+            <a:avLst/>
+          </a:prstGeom>
+          <a:noFill/>
+        </p:spPr>
+        <p:txBody>
+          <a:bodyPr wrap="square" rtlCol="0">
+            <a:spAutoFit/>
+          </a:bodyPr>
+          <a:lstStyle/>
+          <a:p>
+            <a:pPr algn="just"/>
+            <a:r>
+              <a:rPr lang="de-DE" sz="2800" i="1" u="sng" dirty="0"/>
+              <a:t>Abbildung 1</a:t>
+            </a:r>
+            <a:r>
+              <a:rPr lang="de-DE" sz="2800" i="1" dirty="0"/>
+              <a:t>: Vertikalprofile der Größen a-d im Verlauf eines Messtages sowie die daraus ermittelten Grenzschichthöhen (schwarze Linien). Im rot markierten Zeitabschnitt ist die Wahrscheinlichkeit von Strahlungsfehlern an einzelnen Sensoren aufgrund des Sonnenstands erhöht. </a:t>
+            </a:r>
+            <a:endParaRPr lang="de-DE" dirty="0"/>
+          </a:p>
+        </p:txBody>
+      </p:sp>
+      <p:sp>
+        <p:nvSpPr>
+          <p:cNvPr id="57" name="Textfeld 56">
+            <a:extLst>
+              <a:ext uri="{FF2B5EF4-FFF2-40B4-BE49-F238E27FC236}">
+                <a16:creationId xmlns:a16="http://schemas.microsoft.com/office/drawing/2014/main" id="{08A6F72A-C1FC-4C0D-A939-FC387DC90072}"/>
+              </a:ext>
+            </a:extLst>
+          </p:cNvPr>
+          <p:cNvSpPr txBox="1"/>
+          <p:nvPr/>
+        </p:nvSpPr>
+        <p:spPr>
+          <a:xfrm>
+            <a:off x="1114446" y="30591793"/>
+            <a:ext cx="10679241" cy="954107"/>
+          </a:xfrm>
+          <a:prstGeom prst="rect">
+            <a:avLst/>
+          </a:prstGeom>
+          <a:noFill/>
+        </p:spPr>
+        <p:txBody>
+          <a:bodyPr wrap="square" rtlCol="0">
+            <a:spAutoFit/>
+          </a:bodyPr>
+          <a:lstStyle/>
+          <a:p>
+            <a:pPr algn="just"/>
+            <a:r>
+              <a:rPr lang="de-DE" sz="2800" i="1" u="sng" dirty="0"/>
+              <a:t>Abbildung 2:</a:t>
+            </a:r>
+            <a:r>
+              <a:rPr lang="de-DE" sz="2800" i="1" dirty="0"/>
+              <a:t> Grenzschichthöhen, die mithilfe der Größen a-d und des </a:t>
+            </a:r>
+            <a:r>
+              <a:rPr lang="de-DE" sz="2800" i="1" dirty="0" err="1"/>
+              <a:t>Ceilometers</a:t>
+            </a:r>
+            <a:r>
+              <a:rPr lang="de-DE" sz="2800" i="1" dirty="0"/>
+              <a:t> bestimmt wurden.</a:t>
+            </a:r>
+            <a:endParaRPr lang="de-DE" dirty="0"/>
           </a:p>
         </p:txBody>
       </p:sp>

</xml_diff>

<commit_message>
Noch mehr Text. Noch nicht fertig!!!
</commit_message>
<xml_diff>
--- a/poster/lex2018_poster_Grenzschichthöhe2.pptx
+++ b/poster/lex2018_poster_Grenzschichthöhe2.pptx
@@ -598,7 +598,7 @@
               <a14:shadowObscured xmlns:a14="http://schemas.microsoft.com/office/drawing/2010/main" val="1"/>
             </a:ext>
             <a:ext uri="{FAA26D3D-D897-4be2-8F04-BA451C77F1D7}">
-              <ma14:placeholderFlag xmlns:ma14="http://schemas.microsoft.com/office/mac/drawingml/2011/main" xmlns="" val="1"/>
+              <ma14:placeholderFlag xmlns="" xmlns:ma14="http://schemas.microsoft.com/office/mac/drawingml/2011/main" val="1"/>
             </a:ext>
           </a:extLst>
         </p:spPr>
@@ -1148,7 +1148,7 @@
           <a:noFill/>
           <a:extLst>
             <a:ext uri="{FAA26D3D-D897-4be2-8F04-BA451C77F1D7}">
-              <ma14:placeholderFlag xmlns:ma14="http://schemas.microsoft.com/office/mac/drawingml/2011/main" xmlns="" val="1"/>
+              <ma14:placeholderFlag xmlns="" xmlns:ma14="http://schemas.microsoft.com/office/mac/drawingml/2011/main" val="1"/>
             </a:ext>
           </a:extLst>
         </p:spPr>
@@ -1890,6 +1890,75 @@
           <a:chExt cx="0" cy="0"/>
         </a:xfrm>
       </p:grpSpPr>
+      <p:sp>
+        <p:nvSpPr>
+          <p:cNvPr id="9" name="Rechteck 8">
+            <a:extLst>
+              <a:ext uri="{FF2B5EF4-FFF2-40B4-BE49-F238E27FC236}">
+                <a16:creationId xmlns:a16="http://schemas.microsoft.com/office/drawing/2014/main" id="{0BEFA488-9F8C-44C1-8036-4005CE1E4DD6}"/>
+              </a:ext>
+            </a:extLst>
+          </p:cNvPr>
+          <p:cNvSpPr/>
+          <p:nvPr/>
+        </p:nvSpPr>
+        <p:spPr bwMode="auto">
+          <a:xfrm>
+            <a:off x="1068342" y="32874422"/>
+            <a:ext cx="28157641" cy="2809983"/>
+          </a:xfrm>
+          <a:prstGeom prst="rect">
+            <a:avLst/>
+          </a:prstGeom>
+          <a:solidFill>
+            <a:schemeClr val="bg1">
+              <a:lumMod val="75000"/>
+            </a:schemeClr>
+          </a:solidFill>
+          <a:ln>
+            <a:noFill/>
+          </a:ln>
+          <a:effectLst/>
+          <a:extLst/>
+        </p:spPr>
+        <p:txBody>
+          <a:bodyPr vert="horz" wrap="square" lIns="90000" tIns="46800" rIns="90000" bIns="46800" numCol="1" rtlCol="0" anchor="t" anchorCtr="0" compatLnSpc="1">
+            <a:prstTxWarp prst="textNoShape">
+              <a:avLst/>
+            </a:prstTxWarp>
+          </a:bodyPr>
+          <a:lstStyle/>
+          <a:p>
+            <a:pPr marL="0" marR="0" indent="0" algn="l" defTabSz="914400" rtl="0" eaLnBrk="0" fontAlgn="base" latinLnBrk="0" hangingPunct="0">
+              <a:lnSpc>
+                <a:spcPct val="100000"/>
+              </a:lnSpc>
+              <a:spcBef>
+                <a:spcPct val="0"/>
+              </a:spcBef>
+              <a:spcAft>
+                <a:spcPct val="0"/>
+              </a:spcAft>
+              <a:buClrTx/>
+              <a:buSzTx/>
+              <a:buFontTx/>
+              <a:buNone/>
+              <a:tabLst/>
+            </a:pPr>
+            <a:endParaRPr kumimoji="0" lang="de-DE" sz="2400" b="0" i="0" u="none" strike="noStrike" cap="none" normalizeH="0" baseline="0">
+              <a:ln>
+                <a:noFill/>
+              </a:ln>
+              <a:solidFill>
+                <a:srgbClr val="000000"/>
+              </a:solidFill>
+              <a:effectLst/>
+              <a:latin typeface="Arial" charset="0"/>
+              <a:ea typeface="ＭＳ Ｐゴシック" pitchFamily="124" charset="-128"/>
+            </a:endParaRPr>
+          </a:p>
+        </p:txBody>
+      </p:sp>
       <p:pic>
         <p:nvPicPr>
           <p:cNvPr id="46" name="Grafik 45">
@@ -2196,30 +2265,6 @@
           </a:p>
         </p:txBody>
       </p:sp>
-      <p:pic>
-        <p:nvPicPr>
-          <p:cNvPr id="12" name="Bild 11"/>
-          <p:cNvPicPr>
-            <a:picLocks noChangeAspect="1"/>
-          </p:cNvPicPr>
-          <p:nvPr/>
-        </p:nvPicPr>
-        <p:blipFill>
-          <a:blip r:embed="rId10"/>
-          <a:stretch>
-            <a:fillRect/>
-          </a:stretch>
-        </p:blipFill>
-        <p:spPr>
-          <a:xfrm>
-            <a:off x="1744118" y="39294783"/>
-            <a:ext cx="6998755" cy="2269338"/>
-          </a:xfrm>
-          <a:prstGeom prst="rect">
-            <a:avLst/>
-          </a:prstGeom>
-        </p:spPr>
-      </p:pic>
       <p:cxnSp>
         <p:nvCxnSpPr>
           <p:cNvPr id="25" name="Gerade Verbindung 24"/>
@@ -3216,7 +3261,7 @@
           <p:nvPr/>
         </p:nvPicPr>
         <p:blipFill>
-          <a:blip r:embed="rId11"/>
+          <a:blip r:embed="rId10"/>
           <a:stretch>
             <a:fillRect/>
           </a:stretch>
@@ -3246,7 +3291,7 @@
           <p:nvPr/>
         </p:nvPicPr>
         <p:blipFill>
-          <a:blip r:embed="rId12" cstate="email">
+          <a:blip r:embed="rId11" cstate="email">
             <a:extLst>
               <a:ext uri="{28A0092B-C50C-407E-A947-70E740481C1C}">
                 <a14:useLocalDpi xmlns:a14="http://schemas.microsoft.com/office/drawing/2010/main" val="0"/>
@@ -3418,7 +3463,7 @@
             <p:spPr>
               <a:xfrm>
                 <a:off x="1384078" y="13264977"/>
-                <a:ext cx="16129792" cy="10587514"/>
+                <a:ext cx="16129792" cy="11203067"/>
               </a:xfrm>
               <a:prstGeom prst="rect">
                 <a:avLst/>
@@ -3453,7 +3498,11 @@
                 </a:r>
               </a:p>
               <a:p>
-                <a:pPr algn="just"/>
+                <a:pPr algn="just">
+                  <a:spcBef>
+                    <a:spcPts val="1200"/>
+                  </a:spcBef>
+                </a:pPr>
                 <a:r>
                   <a:rPr lang="de-DE" sz="3200" dirty="0">
                     <a:solidFill>
@@ -3573,16 +3622,11 @@
                 </a:endParaRPr>
               </a:p>
               <a:p>
-                <a:pPr algn="just"/>
-                <a:endParaRPr lang="de-DE" sz="3200" dirty="0">
-                  <a:solidFill>
-                    <a:schemeClr val="tx1"/>
-                  </a:solidFill>
-                  <a:ea typeface="ＭＳ Ｐゴシック" pitchFamily="124" charset="-128"/>
-                </a:endParaRPr>
-              </a:p>
-              <a:p>
-                <a:pPr algn="just"/>
+                <a:pPr algn="just">
+                  <a:spcBef>
+                    <a:spcPts val="1200"/>
+                  </a:spcBef>
+                </a:pPr>
                 <a:r>
                   <a:rPr lang="de-DE" sz="3200" dirty="0">
                     <a:solidFill>
@@ -3675,7 +3719,11 @@
                 </a:r>
               </a:p>
               <a:p>
-                <a:pPr algn="ctr"/>
+                <a:pPr algn="ctr">
+                  <a:spcBef>
+                    <a:spcPts val="1200"/>
+                  </a:spcBef>
+                </a:pPr>
                 <a14:m>
                   <m:oMath xmlns:m="http://schemas.openxmlformats.org/officeDocument/2006/math">
                     <m:sSub>
@@ -3784,16 +3832,11 @@
                 </a:r>
               </a:p>
               <a:p>
-                <a:pPr algn="just"/>
-                <a:endParaRPr lang="de-DE" sz="3200" dirty="0">
-                  <a:solidFill>
-                    <a:schemeClr val="tx1"/>
-                  </a:solidFill>
-                  <a:ea typeface="ＭＳ Ｐゴシック" pitchFamily="124" charset="-128"/>
-                </a:endParaRPr>
-              </a:p>
-              <a:p>
-                <a:pPr algn="just"/>
+                <a:pPr algn="just">
+                  <a:spcBef>
+                    <a:spcPts val="1200"/>
+                  </a:spcBef>
+                </a:pPr>
                 <a:r>
                   <a:rPr lang="de-DE" sz="3200" dirty="0">
                     <a:solidFill>
@@ -3837,7 +3880,7 @@
                     </a:solidFill>
                     <a:ea typeface="ＭＳ Ｐゴシック" pitchFamily="124" charset="-128"/>
                   </a:rPr>
-                  <a:t>. Tag 1 entspricht dem in Abbildung 1 gezeigten Tag. </a:t>
+                  <a:t>. Tag 1 entspricht dem in Abbildung 1 gezeigten Tag. An beiden Messtagen befand Fehmarn sich unter Hochdruckeinfluss und es herrschte auflandiger Wind, sodass eine flache, maritime Grenzschicht zu erwarten ist.</a:t>
                 </a:r>
               </a:p>
               <a:p>
@@ -3888,15 +3931,15 @@
             <p:spPr>
               <a:xfrm>
                 <a:off x="1384078" y="13264977"/>
-                <a:ext cx="16129792" cy="10587514"/>
+                <a:ext cx="16129792" cy="11203067"/>
               </a:xfrm>
               <a:prstGeom prst="rect">
                 <a:avLst/>
               </a:prstGeom>
               <a:blipFill>
-                <a:blip r:embed="rId13"/>
+                <a:blip r:embed="rId12"/>
                 <a:stretch>
-                  <a:fillRect l="-1323" t="-1036" r="-983"/>
+                  <a:fillRect l="-1323" t="-979" r="-983"/>
                 </a:stretch>
               </a:blipFill>
             </p:spPr>
@@ -3929,8 +3972,8 @@
         </p:nvSpPr>
         <p:spPr>
           <a:xfrm>
-            <a:off x="12257286" y="23490113"/>
-            <a:ext cx="16633848" cy="7140416"/>
+            <a:off x="12257286" y="23729353"/>
+            <a:ext cx="16633848" cy="8617744"/>
           </a:xfrm>
           <a:prstGeom prst="rect">
             <a:avLst/>
@@ -3964,7 +4007,25 @@
                 </a:solidFill>
                 <a:ea typeface="ＭＳ Ｐゴシック" pitchFamily="124" charset="-128"/>
               </a:rPr>
-              <a:t>Die aus den Gradienten der Größen a-d abgeleiteten Grenzschichthöhen sind untereinander weitestgehend konsistent. An Tag 1 zeigt sich ein Absinken der Grenzschichthöhe von ca. 400 m auf ca. 100 m. </a:t>
+              <a:t>Die aus den Gradienten der Größen a-d abgeleiteten Grenzschichthöhen sind untereinander weitestgehend konsistent (Abbildung 2). An beiden Tagen zeigt sich ein Absinken der Grenzschichthöhe von ca. 400 m auf ca. 100 m im Verlauf des Tages, während die Luft in der freien Atmosphäre zunehmend trockener wird (Abbildung 1, nur für Tag 1 gezeigt). Dies deutet auf ein </a:t>
+            </a:r>
+            <a:r>
+              <a:rPr lang="de-DE" sz="3200" dirty="0" err="1">
+                <a:solidFill>
+                  <a:schemeClr val="tx1"/>
+                </a:solidFill>
+                <a:ea typeface="ＭＳ Ｐゴシック" pitchFamily="124" charset="-128"/>
+              </a:rPr>
+              <a:t>großskaliges</a:t>
+            </a:r>
+            <a:r>
+              <a:rPr lang="de-DE" sz="3200" dirty="0">
+                <a:solidFill>
+                  <a:schemeClr val="tx1"/>
+                </a:solidFill>
+                <a:ea typeface="ＭＳ Ｐゴシック" pitchFamily="124" charset="-128"/>
+              </a:rPr>
+              <a:t> Absinken der Luft hin, was zur vorherrschenden Hochdruckwetterlage an beiden Tagen passt. </a:t>
             </a:r>
           </a:p>
           <a:p>
@@ -4097,23 +4158,15 @@
         </p:nvSpPr>
         <p:spPr bwMode="auto">
           <a:xfrm>
-            <a:off x="1123374" y="32995169"/>
-            <a:ext cx="28079987" cy="2569301"/>
+            <a:off x="1312070" y="32995169"/>
+            <a:ext cx="27544693" cy="2736304"/>
           </a:xfrm>
           <a:prstGeom prst="rect">
             <a:avLst/>
           </a:prstGeom>
-          <a:solidFill>
-            <a:schemeClr val="bg1">
-              <a:lumMod val="75000"/>
-            </a:schemeClr>
-          </a:solidFill>
+          <a:noFill/>
           <a:ln>
-            <a:solidFill>
-              <a:schemeClr val="bg1">
-                <a:lumMod val="50000"/>
-              </a:schemeClr>
-            </a:solidFill>
+            <a:noFill/>
           </a:ln>
           <a:effectLst/>
           <a:extLst/>
@@ -4143,7 +4196,7 @@
               <a:tabLst/>
             </a:pPr>
             <a:r>
-              <a:rPr kumimoji="0" lang="de-DE" sz="4800" b="1" i="0" u="none" strike="noStrike" cap="none" normalizeH="0" baseline="0" dirty="0">
+              <a:rPr kumimoji="0" lang="de-DE" sz="4400" b="1" i="0" u="none" strike="noStrike" cap="none" normalizeH="0" baseline="0" dirty="0">
                 <a:ln>
                   <a:noFill/>
                 </a:ln>
@@ -4158,7 +4211,7 @@
             </a:r>
           </a:p>
           <a:p>
-            <a:pPr marL="0" marR="0" indent="0" algn="just" defTabSz="914400" rtl="0" eaLnBrk="0" fontAlgn="base" latinLnBrk="0" hangingPunct="0">
+            <a:pPr marR="0" indent="0" algn="just" defTabSz="914400" rtl="0" eaLnBrk="0" fontAlgn="base" latinLnBrk="0" hangingPunct="0">
               <a:lnSpc>
                 <a:spcPct val="100000"/>
               </a:lnSpc>
@@ -4181,7 +4234,7 @@
                 </a:solidFill>
                 <a:ea typeface="ＭＳ Ｐゴシック" pitchFamily="124" charset="-128"/>
               </a:rPr>
-              <a:t>Die aus den Messungen der ALPACAs gewonnenen Vertikalprofile von relativer Feuchte, spezifischer Feuchte, potentieller Temperatur und pseudopotentieller Temperatur können genutzt werden, um die Höhe der Grenzschicht abzuschätzen. Die ermittelten Grenzschichthöhen stimmen nur in manchen Zeitabschnitten mit denen des </a:t>
+              <a:t>Die Grenzschichthöhe lässt sich aus Vertikalprofilen von relativer Feuchte, spezifischer Feuchte, potentieller Temperatur und pseudopotentieller Temperatur abschätzen, die aus den Messungen der ALPACAs gewonnen wurden. Sie stimmt nur dann mit der Grenzschichthöhe des </a:t>
             </a:r>
             <a:r>
               <a:rPr lang="de-DE" sz="3200" b="1" i="1" dirty="0" err="1">
@@ -4199,7 +4252,7 @@
                 </a:solidFill>
                 <a:ea typeface="ＭＳ Ｐゴシック" pitchFamily="124" charset="-128"/>
               </a:rPr>
-              <a:t> überein, da… </a:t>
+              <a:t> überein, wenn in gleicher Höhe eine ausreichend ausgeprägte „Aerosol-Grenzschicht“ endet. </a:t>
             </a:r>
           </a:p>
         </p:txBody>
@@ -4375,7 +4428,7 @@
           <p:nvPr/>
         </p:nvPicPr>
         <p:blipFill rotWithShape="1">
-          <a:blip r:embed="rId14" cstate="email">
+          <a:blip r:embed="rId13" cstate="email">
             <a:extLst>
               <a:ext uri="{28A0092B-C50C-407E-A947-70E740481C1C}">
                 <a14:useLocalDpi xmlns:a14="http://schemas.microsoft.com/office/drawing/2010/main" val="0"/>
@@ -4674,7 +4727,7 @@
           <p:nvPr/>
         </p:nvPicPr>
         <p:blipFill>
-          <a:blip r:embed="rId15" cstate="email">
+          <a:blip r:embed="rId14" cstate="email">
             <a:extLst>
               <a:ext uri="{28A0092B-C50C-407E-A947-70E740481C1C}">
                 <a14:useLocalDpi xmlns:a14="http://schemas.microsoft.com/office/drawing/2010/main" val="0"/>
@@ -4886,7 +4939,7 @@
           <p:nvPr/>
         </p:nvPicPr>
         <p:blipFill>
-          <a:blip r:embed="rId16" cstate="email">
+          <a:blip r:embed="rId15" cstate="email">
             <a:extLst>
               <a:ext uri="{28A0092B-C50C-407E-A947-70E740481C1C}">
                 <a14:useLocalDpi xmlns:a14="http://schemas.microsoft.com/office/drawing/2010/main" val="0"/>
@@ -4901,6 +4954,129 @@
           <a:xfrm>
             <a:off x="7594882" y="28387337"/>
             <a:ext cx="3562533" cy="1524078"/>
+          </a:xfrm>
+          <a:prstGeom prst="rect">
+            <a:avLst/>
+          </a:prstGeom>
+        </p:spPr>
+      </p:pic>
+      <p:sp>
+        <p:nvSpPr>
+          <p:cNvPr id="7" name="Rechteck 6">
+            <a:extLst>
+              <a:ext uri="{FF2B5EF4-FFF2-40B4-BE49-F238E27FC236}">
+                <a16:creationId xmlns:a16="http://schemas.microsoft.com/office/drawing/2014/main" id="{FA16231D-25CD-46DC-B80B-E9959F4A5A2B}"/>
+              </a:ext>
+            </a:extLst>
+          </p:cNvPr>
+          <p:cNvSpPr/>
+          <p:nvPr/>
+        </p:nvSpPr>
+        <p:spPr bwMode="auto">
+          <a:xfrm>
+            <a:off x="1145997" y="32899354"/>
+            <a:ext cx="28079987" cy="2710231"/>
+          </a:xfrm>
+          <a:prstGeom prst="rect">
+            <a:avLst/>
+          </a:prstGeom>
+          <a:noFill/>
+          <a:ln>
+            <a:noFill/>
+          </a:ln>
+          <a:effectLst/>
+          <a:extLst>
+            <a:ext uri="{909E8E84-426E-40DD-AFC4-6F175D3DCCD1}">
+              <a14:hiddenFill xmlns:a14="http://schemas.microsoft.com/office/drawing/2010/main">
+                <a:solidFill>
+                  <a:schemeClr val="accent1"/>
+                </a:solidFill>
+              </a14:hiddenFill>
+            </a:ext>
+            <a:ext uri="{91240B29-F687-4F45-9708-019B960494DF}">
+              <a14:hiddenLine xmlns:a14="http://schemas.microsoft.com/office/drawing/2010/main" w="9525" cap="flat" cmpd="sng" algn="ctr">
+                <a:solidFill>
+                  <a:schemeClr val="tx1"/>
+                </a:solidFill>
+                <a:prstDash val="solid"/>
+                <a:round/>
+                <a:headEnd type="none" w="med" len="med"/>
+                <a:tailEnd type="none" w="med" len="med"/>
+              </a14:hiddenLine>
+            </a:ext>
+            <a:ext uri="{AF507438-7753-43E0-B8FC-AC1667EBCBE1}">
+              <a14:hiddenEffects xmlns:a14="http://schemas.microsoft.com/office/drawing/2010/main">
+                <a:effectLst>
+                  <a:outerShdw dist="35921" dir="2700000" algn="ctr" rotWithShape="0">
+                    <a:schemeClr val="bg2"/>
+                  </a:outerShdw>
+                </a:effectLst>
+              </a14:hiddenEffects>
+            </a:ext>
+          </a:extLst>
+        </p:spPr>
+        <p:txBody>
+          <a:bodyPr vert="horz" wrap="square" lIns="90000" tIns="46800" rIns="90000" bIns="46800" numCol="1" rtlCol="0" anchor="t" anchorCtr="0" compatLnSpc="1">
+            <a:prstTxWarp prst="textNoShape">
+              <a:avLst/>
+            </a:prstTxWarp>
+          </a:bodyPr>
+          <a:lstStyle/>
+          <a:p>
+            <a:pPr marL="0" marR="0" indent="0" algn="l" defTabSz="914400" rtl="0" eaLnBrk="0" fontAlgn="base" latinLnBrk="0" hangingPunct="0">
+              <a:lnSpc>
+                <a:spcPct val="100000"/>
+              </a:lnSpc>
+              <a:spcBef>
+                <a:spcPct val="0"/>
+              </a:spcBef>
+              <a:spcAft>
+                <a:spcPct val="0"/>
+              </a:spcAft>
+              <a:buClrTx/>
+              <a:buSzTx/>
+              <a:buFontTx/>
+              <a:buNone/>
+              <a:tabLst/>
+            </a:pPr>
+            <a:endParaRPr kumimoji="0" lang="de-DE" sz="2400" b="0" i="0" u="none" strike="noStrike" cap="none" normalizeH="0" baseline="0">
+              <a:ln>
+                <a:noFill/>
+              </a:ln>
+              <a:solidFill>
+                <a:srgbClr val="000000"/>
+              </a:solidFill>
+              <a:effectLst/>
+              <a:latin typeface="Arial" charset="0"/>
+              <a:ea typeface="ＭＳ Ｐゴシック" pitchFamily="124" charset="-128"/>
+            </a:endParaRPr>
+          </a:p>
+        </p:txBody>
+      </p:sp>
+      <p:pic>
+        <p:nvPicPr>
+          <p:cNvPr id="43" name="Bild 11">
+            <a:extLst>
+              <a:ext uri="{FF2B5EF4-FFF2-40B4-BE49-F238E27FC236}">
+                <a16:creationId xmlns:a16="http://schemas.microsoft.com/office/drawing/2014/main" id="{6FEF69BF-68F2-47C5-A1FB-163FA70B573F}"/>
+              </a:ext>
+            </a:extLst>
+          </p:cNvPr>
+          <p:cNvPicPr>
+            <a:picLocks noChangeAspect="1"/>
+          </p:cNvPicPr>
+          <p:nvPr/>
+        </p:nvPicPr>
+        <p:blipFill>
+          <a:blip r:embed="rId16"/>
+          <a:stretch>
+            <a:fillRect/>
+          </a:stretch>
+        </p:blipFill>
+        <p:spPr>
+          <a:xfrm>
+            <a:off x="1744118" y="39294783"/>
+            <a:ext cx="6998755" cy="2269338"/>
           </a:xfrm>
           <a:prstGeom prst="rect">
             <a:avLst/>

</xml_diff>